<commit_message>
add session_id to post-nonce page
</commit_message>
<xml_diff>
--- a/rest-api-workshop.pptx
+++ b/rest-api-workshop.pptx
@@ -9,7 +9,7 @@
   </p:notesMasterIdLst>
   <p:sldIdLst>
     <p:sldId id="264" r:id="rId2"/>
-    <p:sldId id="269" r:id="rId3"/>
+    <p:sldId id="305" r:id="rId3"/>
     <p:sldId id="296" r:id="rId4"/>
     <p:sldId id="303" r:id="rId5"/>
     <p:sldId id="294" r:id="rId6"/>
@@ -124,7 +124,7 @@
         <p14:section name="Untitled Section" id="{83089785-02FD-4019-B97A-DDFCEAF7B530}">
           <p14:sldIdLst>
             <p14:sldId id="264"/>
-            <p14:sldId id="269"/>
+            <p14:sldId id="305"/>
             <p14:sldId id="296"/>
             <p14:sldId id="303"/>
             <p14:sldId id="294"/>
@@ -247,7 +247,7 @@
           <a:p>
             <a:fld id="{70FE56F2-0B60-44FC-AC55-491897A4F355}" type="datetimeFigureOut">
               <a:rPr lang="en-GB" smtClean="0"/>
-              <a:t>12/05/2020</a:t>
+              <a:t>17/05/2020</a:t>
             </a:fld>
             <a:endParaRPr lang="en-GB"/>
           </a:p>
@@ -664,7 +664,7 @@
           <a:p>
             <a:fld id="{4D723AB6-704A-42C8-AB51-31B091223600}" type="datetimeFigureOut">
               <a:rPr lang="en-GB" smtClean="0"/>
-              <a:t>12/05/2020</a:t>
+              <a:t>17/05/2020</a:t>
             </a:fld>
             <a:endParaRPr lang="en-GB"/>
           </a:p>
@@ -864,7 +864,7 @@
           <a:p>
             <a:fld id="{4D723AB6-704A-42C8-AB51-31B091223600}" type="datetimeFigureOut">
               <a:rPr lang="en-GB" smtClean="0"/>
-              <a:t>12/05/2020</a:t>
+              <a:t>17/05/2020</a:t>
             </a:fld>
             <a:endParaRPr lang="en-GB"/>
           </a:p>
@@ -1074,7 +1074,7 @@
           <a:p>
             <a:fld id="{4D723AB6-704A-42C8-AB51-31B091223600}" type="datetimeFigureOut">
               <a:rPr lang="en-GB" smtClean="0"/>
-              <a:t>12/05/2020</a:t>
+              <a:t>17/05/2020</a:t>
             </a:fld>
             <a:endParaRPr lang="en-GB"/>
           </a:p>
@@ -1274,7 +1274,7 @@
           <a:p>
             <a:fld id="{4D723AB6-704A-42C8-AB51-31B091223600}" type="datetimeFigureOut">
               <a:rPr lang="en-GB" smtClean="0"/>
-              <a:t>12/05/2020</a:t>
+              <a:t>17/05/2020</a:t>
             </a:fld>
             <a:endParaRPr lang="en-GB"/>
           </a:p>
@@ -1550,7 +1550,7 @@
           <a:p>
             <a:fld id="{4D723AB6-704A-42C8-AB51-31B091223600}" type="datetimeFigureOut">
               <a:rPr lang="en-GB" smtClean="0"/>
-              <a:t>12/05/2020</a:t>
+              <a:t>17/05/2020</a:t>
             </a:fld>
             <a:endParaRPr lang="en-GB"/>
           </a:p>
@@ -1818,7 +1818,7 @@
           <a:p>
             <a:fld id="{4D723AB6-704A-42C8-AB51-31B091223600}" type="datetimeFigureOut">
               <a:rPr lang="en-GB" smtClean="0"/>
-              <a:t>12/05/2020</a:t>
+              <a:t>17/05/2020</a:t>
             </a:fld>
             <a:endParaRPr lang="en-GB"/>
           </a:p>
@@ -2233,7 +2233,7 @@
           <a:p>
             <a:fld id="{4D723AB6-704A-42C8-AB51-31B091223600}" type="datetimeFigureOut">
               <a:rPr lang="en-GB" smtClean="0"/>
-              <a:t>12/05/2020</a:t>
+              <a:t>17/05/2020</a:t>
             </a:fld>
             <a:endParaRPr lang="en-GB"/>
           </a:p>
@@ -2375,7 +2375,7 @@
           <a:p>
             <a:fld id="{4D723AB6-704A-42C8-AB51-31B091223600}" type="datetimeFigureOut">
               <a:rPr lang="en-GB" smtClean="0"/>
-              <a:t>12/05/2020</a:t>
+              <a:t>17/05/2020</a:t>
             </a:fld>
             <a:endParaRPr lang="en-GB"/>
           </a:p>
@@ -2488,7 +2488,7 @@
           <a:p>
             <a:fld id="{4D723AB6-704A-42C8-AB51-31B091223600}" type="datetimeFigureOut">
               <a:rPr lang="en-GB" smtClean="0"/>
-              <a:t>12/05/2020</a:t>
+              <a:t>17/05/2020</a:t>
             </a:fld>
             <a:endParaRPr lang="en-GB"/>
           </a:p>
@@ -2801,7 +2801,7 @@
           <a:p>
             <a:fld id="{4D723AB6-704A-42C8-AB51-31B091223600}" type="datetimeFigureOut">
               <a:rPr lang="en-GB" smtClean="0"/>
-              <a:t>12/05/2020</a:t>
+              <a:t>17/05/2020</a:t>
             </a:fld>
             <a:endParaRPr lang="en-GB"/>
           </a:p>
@@ -3090,7 +3090,7 @@
           <a:p>
             <a:fld id="{4D723AB6-704A-42C8-AB51-31B091223600}" type="datetimeFigureOut">
               <a:rPr lang="en-GB" smtClean="0"/>
-              <a:t>12/05/2020</a:t>
+              <a:t>17/05/2020</a:t>
             </a:fld>
             <a:endParaRPr lang="en-GB"/>
           </a:p>
@@ -3333,7 +3333,7 @@
           <a:p>
             <a:fld id="{4D723AB6-704A-42C8-AB51-31B091223600}" type="datetimeFigureOut">
               <a:rPr lang="en-GB" smtClean="0"/>
-              <a:t>12/05/2020</a:t>
+              <a:t>17/05/2020</a:t>
             </a:fld>
             <a:endParaRPr lang="en-GB"/>
           </a:p>
@@ -4909,17 +4909,15 @@
               <a:rPr lang="en-GB" u="sng" dirty="0">
                 <a:hlinkClick r:id="rId3"/>
               </a:rPr>
-              <a:t>https://www.wpjs.co.uk/london.zip</a:t>
+              <a:t>https://www.wpjs.co.uk/rest.zip</a:t>
             </a:r>
             <a:endParaRPr lang="en-GB" sz="1600" dirty="0"/>
           </a:p>
           <a:p>
             <a:pPr lvl="1"/>
             <a:r>
-              <a:rPr lang="en-GB" u="sng" dirty="0">
-                <a:hlinkClick r:id="rId4"/>
-              </a:rPr>
-              <a:t>https://github.com/iwswordpress/LONDON</a:t>
+              <a:rPr lang="en-GB" u="sng" dirty="0"/>
+              <a:t>https://github.com/iwswordpress/rest</a:t>
             </a:r>
             <a:endParaRPr lang="en-GB" sz="1600" dirty="0"/>
           </a:p>
@@ -4972,19 +4970,6 @@
                 <a:cs typeface="Segoe UI" panose="020B0502040204020203" pitchFamily="34" charset="0"/>
               </a:rPr>
               <a:t>Handbook</a:t>
-            </a:r>
-          </a:p>
-          <a:p>
-            <a:pPr lvl="1"/>
-            <a:r>
-              <a:rPr lang="en-GB" dirty="0">
-                <a:solidFill>
-                  <a:srgbClr val="2196F3"/>
-                </a:solidFill>
-                <a:latin typeface="Segoe UI" panose="020B0502040204020203" pitchFamily="34" charset="0"/>
-                <a:cs typeface="Segoe UI" panose="020B0502040204020203" pitchFamily="34" charset="0"/>
-              </a:rPr>
-              <a:t>FREE coupon to my Udemy course</a:t>
             </a:r>
           </a:p>
           <a:p>
@@ -5544,7 +5529,7 @@
         </p:blipFill>
         <p:spPr bwMode="auto">
           <a:xfrm>
-            <a:off x="8303598" y="4132270"/>
+            <a:off x="8320957" y="4122993"/>
             <a:ext cx="3525929" cy="2367777"/>
           </a:xfrm>
           <a:prstGeom prst="rect">
@@ -5730,10 +5715,97 @@
           </a:p>
         </p:txBody>
       </p:sp>
+      <p:cxnSp>
+        <p:nvCxnSpPr>
+          <p:cNvPr id="9" name="Straight Arrow Connector 8">
+            <a:extLst>
+              <a:ext uri="{FF2B5EF4-FFF2-40B4-BE49-F238E27FC236}">
+                <a16:creationId xmlns:a16="http://schemas.microsoft.com/office/drawing/2014/main" id="{CF93C976-3C1F-4C74-9D39-90DABBE18BB7}"/>
+              </a:ext>
+            </a:extLst>
+          </p:cNvPr>
+          <p:cNvCxnSpPr>
+            <a:cxnSpLocks/>
+          </p:cNvCxnSpPr>
+          <p:nvPr/>
+        </p:nvCxnSpPr>
+        <p:spPr>
+          <a:xfrm flipH="1" flipV="1">
+            <a:off x="8672218" y="4142117"/>
+            <a:ext cx="682807" cy="748283"/>
+          </a:xfrm>
+          <a:prstGeom prst="straightConnector1">
+            <a:avLst/>
+          </a:prstGeom>
+          <a:ln w="50800">
+            <a:solidFill>
+              <a:schemeClr val="bg1"/>
+            </a:solidFill>
+            <a:tailEnd type="triangle"/>
+          </a:ln>
+        </p:spPr>
+        <p:style>
+          <a:lnRef idx="3">
+            <a:schemeClr val="accent1"/>
+          </a:lnRef>
+          <a:fillRef idx="0">
+            <a:schemeClr val="accent1"/>
+          </a:fillRef>
+          <a:effectRef idx="2">
+            <a:schemeClr val="accent1"/>
+          </a:effectRef>
+          <a:fontRef idx="minor">
+            <a:schemeClr val="tx1"/>
+          </a:fontRef>
+        </p:style>
+      </p:cxnSp>
+      <p:sp>
+        <p:nvSpPr>
+          <p:cNvPr id="10" name="TextBox 9">
+            <a:extLst>
+              <a:ext uri="{FF2B5EF4-FFF2-40B4-BE49-F238E27FC236}">
+                <a16:creationId xmlns:a16="http://schemas.microsoft.com/office/drawing/2014/main" id="{C6D2AB8D-F566-4A3A-ABB8-05B92FD0E743}"/>
+              </a:ext>
+            </a:extLst>
+          </p:cNvPr>
+          <p:cNvSpPr txBox="1"/>
+          <p:nvPr/>
+        </p:nvSpPr>
+        <p:spPr>
+          <a:xfrm>
+            <a:off x="8066040" y="5058423"/>
+            <a:ext cx="1845578" cy="369332"/>
+          </a:xfrm>
+          <a:prstGeom prst="rect">
+            <a:avLst/>
+          </a:prstGeom>
+          <a:noFill/>
+        </p:spPr>
+        <p:txBody>
+          <a:bodyPr wrap="square" rtlCol="0">
+            <a:spAutoFit/>
+          </a:bodyPr>
+          <a:lstStyle/>
+          <a:p>
+            <a:pPr algn="ctr"/>
+            <a:r>
+              <a:rPr lang="en-GB" dirty="0">
+                <a:solidFill>
+                  <a:schemeClr val="bg1"/>
+                </a:solidFill>
+                <a:highlight>
+                  <a:srgbClr val="0000FF"/>
+                </a:highlight>
+              </a:rPr>
+              <a:t>15 min walk</a:t>
+            </a:r>
+          </a:p>
+        </p:txBody>
+      </p:sp>
     </p:spTree>
     <p:extLst>
       <p:ext uri="{BB962C8B-B14F-4D97-AF65-F5344CB8AC3E}">
-        <p14:creationId xmlns:p14="http://schemas.microsoft.com/office/powerpoint/2010/main" val="2449607764"/>
+        <p14:creationId xmlns:p14="http://schemas.microsoft.com/office/powerpoint/2010/main" val="138352021"/>
       </p:ext>
     </p:extLst>
   </p:cSld>

</xml_diff>

<commit_message>
edit logged out session variable
</commit_message>
<xml_diff>
--- a/rest-api-workshop.pptx
+++ b/rest-api-workshop.pptx
@@ -5,11 +5,11 @@
     <p:sldMasterId id="2147483648" r:id="rId1"/>
   </p:sldMasterIdLst>
   <p:notesMasterIdLst>
-    <p:notesMasterId r:id="rId14"/>
+    <p:notesMasterId r:id="rId13"/>
   </p:notesMasterIdLst>
   <p:sldIdLst>
     <p:sldId id="264" r:id="rId2"/>
-    <p:sldId id="305" r:id="rId3"/>
+    <p:sldId id="269" r:id="rId3"/>
     <p:sldId id="296" r:id="rId4"/>
     <p:sldId id="303" r:id="rId5"/>
     <p:sldId id="294" r:id="rId6"/>
@@ -19,7 +19,6 @@
     <p:sldId id="300" r:id="rId10"/>
     <p:sldId id="301" r:id="rId11"/>
     <p:sldId id="302" r:id="rId12"/>
-    <p:sldId id="304" r:id="rId13"/>
   </p:sldIdLst>
   <p:sldSz cx="12192000" cy="6858000"/>
   <p:notesSz cx="6858000" cy="9144000"/>
@@ -124,7 +123,7 @@
         <p14:section name="Untitled Section" id="{83089785-02FD-4019-B97A-DDFCEAF7B530}">
           <p14:sldIdLst>
             <p14:sldId id="264"/>
-            <p14:sldId id="305"/>
+            <p14:sldId id="269"/>
             <p14:sldId id="296"/>
             <p14:sldId id="303"/>
             <p14:sldId id="294"/>
@@ -134,7 +133,6 @@
             <p14:sldId id="300"/>
             <p14:sldId id="301"/>
             <p14:sldId id="302"/>
-            <p14:sldId id="304"/>
           </p14:sldIdLst>
         </p14:section>
       </p14:sectionLst>
@@ -247,7 +245,7 @@
           <a:p>
             <a:fld id="{70FE56F2-0B60-44FC-AC55-491897A4F355}" type="datetimeFigureOut">
               <a:rPr lang="en-GB" smtClean="0"/>
-              <a:t>17/05/2020</a:t>
+              <a:t>02/03/2020</a:t>
             </a:fld>
             <a:endParaRPr lang="en-GB"/>
           </a:p>
@@ -664,7 +662,7 @@
           <a:p>
             <a:fld id="{4D723AB6-704A-42C8-AB51-31B091223600}" type="datetimeFigureOut">
               <a:rPr lang="en-GB" smtClean="0"/>
-              <a:t>17/05/2020</a:t>
+              <a:t>02/03/2020</a:t>
             </a:fld>
             <a:endParaRPr lang="en-GB"/>
           </a:p>
@@ -864,7 +862,7 @@
           <a:p>
             <a:fld id="{4D723AB6-704A-42C8-AB51-31B091223600}" type="datetimeFigureOut">
               <a:rPr lang="en-GB" smtClean="0"/>
-              <a:t>17/05/2020</a:t>
+              <a:t>02/03/2020</a:t>
             </a:fld>
             <a:endParaRPr lang="en-GB"/>
           </a:p>
@@ -1074,7 +1072,7 @@
           <a:p>
             <a:fld id="{4D723AB6-704A-42C8-AB51-31B091223600}" type="datetimeFigureOut">
               <a:rPr lang="en-GB" smtClean="0"/>
-              <a:t>17/05/2020</a:t>
+              <a:t>02/03/2020</a:t>
             </a:fld>
             <a:endParaRPr lang="en-GB"/>
           </a:p>
@@ -1274,7 +1272,7 @@
           <a:p>
             <a:fld id="{4D723AB6-704A-42C8-AB51-31B091223600}" type="datetimeFigureOut">
               <a:rPr lang="en-GB" smtClean="0"/>
-              <a:t>17/05/2020</a:t>
+              <a:t>02/03/2020</a:t>
             </a:fld>
             <a:endParaRPr lang="en-GB"/>
           </a:p>
@@ -1550,7 +1548,7 @@
           <a:p>
             <a:fld id="{4D723AB6-704A-42C8-AB51-31B091223600}" type="datetimeFigureOut">
               <a:rPr lang="en-GB" smtClean="0"/>
-              <a:t>17/05/2020</a:t>
+              <a:t>02/03/2020</a:t>
             </a:fld>
             <a:endParaRPr lang="en-GB"/>
           </a:p>
@@ -1818,7 +1816,7 @@
           <a:p>
             <a:fld id="{4D723AB6-704A-42C8-AB51-31B091223600}" type="datetimeFigureOut">
               <a:rPr lang="en-GB" smtClean="0"/>
-              <a:t>17/05/2020</a:t>
+              <a:t>02/03/2020</a:t>
             </a:fld>
             <a:endParaRPr lang="en-GB"/>
           </a:p>
@@ -2233,7 +2231,7 @@
           <a:p>
             <a:fld id="{4D723AB6-704A-42C8-AB51-31B091223600}" type="datetimeFigureOut">
               <a:rPr lang="en-GB" smtClean="0"/>
-              <a:t>17/05/2020</a:t>
+              <a:t>02/03/2020</a:t>
             </a:fld>
             <a:endParaRPr lang="en-GB"/>
           </a:p>
@@ -2375,7 +2373,7 @@
           <a:p>
             <a:fld id="{4D723AB6-704A-42C8-AB51-31B091223600}" type="datetimeFigureOut">
               <a:rPr lang="en-GB" smtClean="0"/>
-              <a:t>17/05/2020</a:t>
+              <a:t>02/03/2020</a:t>
             </a:fld>
             <a:endParaRPr lang="en-GB"/>
           </a:p>
@@ -2488,7 +2486,7 @@
           <a:p>
             <a:fld id="{4D723AB6-704A-42C8-AB51-31B091223600}" type="datetimeFigureOut">
               <a:rPr lang="en-GB" smtClean="0"/>
-              <a:t>17/05/2020</a:t>
+              <a:t>02/03/2020</a:t>
             </a:fld>
             <a:endParaRPr lang="en-GB"/>
           </a:p>
@@ -2801,7 +2799,7 @@
           <a:p>
             <a:fld id="{4D723AB6-704A-42C8-AB51-31B091223600}" type="datetimeFigureOut">
               <a:rPr lang="en-GB" smtClean="0"/>
-              <a:t>17/05/2020</a:t>
+              <a:t>02/03/2020</a:t>
             </a:fld>
             <a:endParaRPr lang="en-GB"/>
           </a:p>
@@ -3090,7 +3088,7 @@
           <a:p>
             <a:fld id="{4D723AB6-704A-42C8-AB51-31B091223600}" type="datetimeFigureOut">
               <a:rPr lang="en-GB" smtClean="0"/>
-              <a:t>17/05/2020</a:t>
+              <a:t>02/03/2020</a:t>
             </a:fld>
             <a:endParaRPr lang="en-GB"/>
           </a:p>
@@ -3333,7 +3331,7 @@
           <a:p>
             <a:fld id="{4D723AB6-704A-42C8-AB51-31B091223600}" type="datetimeFigureOut">
               <a:rPr lang="en-GB" smtClean="0"/>
-              <a:t>17/05/2020</a:t>
+              <a:t>02/03/2020</a:t>
             </a:fld>
             <a:endParaRPr lang="en-GB"/>
           </a:p>
@@ -4670,371 +4668,6 @@
 </p:sld>
 </file>
 
-<file path=ppt/slides/slide12.xml><?xml version="1.0" encoding="utf-8"?>
-<p:sld xmlns:a="http://schemas.openxmlformats.org/drawingml/2006/main" xmlns:r="http://schemas.openxmlformats.org/officeDocument/2006/relationships" xmlns:p="http://schemas.openxmlformats.org/presentationml/2006/main">
-  <p:cSld>
-    <p:spTree>
-      <p:nvGrpSpPr>
-        <p:cNvPr id="1" name=""/>
-        <p:cNvGrpSpPr/>
-        <p:nvPr/>
-      </p:nvGrpSpPr>
-      <p:grpSpPr>
-        <a:xfrm>
-          <a:off x="0" y="0"/>
-          <a:ext cx="0" cy="0"/>
-          <a:chOff x="0" y="0"/>
-          <a:chExt cx="0" cy="0"/>
-        </a:xfrm>
-      </p:grpSpPr>
-      <p:sp>
-        <p:nvSpPr>
-          <p:cNvPr id="2" name="Title 1">
-            <a:extLst>
-              <a:ext uri="{FF2B5EF4-FFF2-40B4-BE49-F238E27FC236}">
-                <a16:creationId xmlns:a16="http://schemas.microsoft.com/office/drawing/2014/main" id="{5D7568B3-EC9A-45DD-8A17-CFE685194B65}"/>
-              </a:ext>
-            </a:extLst>
-          </p:cNvPr>
-          <p:cNvSpPr>
-            <a:spLocks noGrp="1"/>
-          </p:cNvSpPr>
-          <p:nvPr>
-            <p:ph type="title"/>
-          </p:nvPr>
-        </p:nvSpPr>
-        <p:spPr>
-          <a:xfrm>
-            <a:off x="838200" y="0"/>
-            <a:ext cx="10515600" cy="1325563"/>
-          </a:xfrm>
-          <a:solidFill>
-            <a:srgbClr val="2196F3"/>
-          </a:solidFill>
-        </p:spPr>
-        <p:txBody>
-          <a:bodyPr>
-            <a:normAutofit/>
-          </a:bodyPr>
-          <a:lstStyle/>
-          <a:p>
-            <a:pPr algn="ctr"/>
-            <a:r>
-              <a:rPr lang="en-GB" sz="6600" dirty="0">
-                <a:solidFill>
-                  <a:schemeClr val="bg1"/>
-                </a:solidFill>
-                <a:latin typeface="Segoe UI" panose="020B0502040204020203" pitchFamily="34" charset="0"/>
-                <a:cs typeface="Segoe UI" panose="020B0502040204020203" pitchFamily="34" charset="0"/>
-              </a:rPr>
-              <a:t>WP REST API &amp; AJAX</a:t>
-            </a:r>
-          </a:p>
-        </p:txBody>
-      </p:sp>
-      <p:sp>
-        <p:nvSpPr>
-          <p:cNvPr id="4" name="Content Placeholder 2">
-            <a:extLst>
-              <a:ext uri="{FF2B5EF4-FFF2-40B4-BE49-F238E27FC236}">
-                <a16:creationId xmlns:a16="http://schemas.microsoft.com/office/drawing/2014/main" id="{088CCB65-11B4-408B-9ED3-1304FE85032F}"/>
-              </a:ext>
-            </a:extLst>
-          </p:cNvPr>
-          <p:cNvSpPr>
-            <a:spLocks noGrp="1"/>
-          </p:cNvSpPr>
-          <p:nvPr>
-            <p:ph idx="1"/>
-          </p:nvPr>
-        </p:nvSpPr>
-        <p:spPr>
-          <a:xfrm>
-            <a:off x="838200" y="1325563"/>
-            <a:ext cx="10515600" cy="4919125"/>
-          </a:xfrm>
-        </p:spPr>
-        <p:txBody>
-          <a:bodyPr wrap="square" bIns="252000">
-            <a:normAutofit fontScale="85000" lnSpcReduction="20000"/>
-          </a:bodyPr>
-          <a:lstStyle/>
-          <a:p>
-            <a:endParaRPr lang="en-GB" sz="1200" dirty="0">
-              <a:latin typeface="Segoe UI" panose="020B0502040204020203" pitchFamily="34" charset="0"/>
-              <a:cs typeface="Segoe UI" panose="020B0502040204020203" pitchFamily="34" charset="0"/>
-            </a:endParaRPr>
-          </a:p>
-          <a:p>
-            <a:pPr marL="457200" lvl="1" indent="0">
-              <a:buNone/>
-            </a:pPr>
-            <a:r>
-              <a:rPr lang="en-GB" sz="4800" b="1" dirty="0">
-                <a:solidFill>
-                  <a:srgbClr val="2196F3"/>
-                </a:solidFill>
-                <a:latin typeface="Segoe UI" panose="020B0502040204020203" pitchFamily="34" charset="0"/>
-                <a:cs typeface="Segoe UI" panose="020B0502040204020203" pitchFamily="34" charset="0"/>
-              </a:rPr>
-              <a:t>WORKSHOP: REST API and AJAX </a:t>
-            </a:r>
-          </a:p>
-          <a:p>
-            <a:pPr marL="457200" lvl="1" indent="0">
-              <a:buNone/>
-            </a:pPr>
-            <a:endParaRPr lang="en-GB" sz="1100" dirty="0">
-              <a:solidFill>
-                <a:srgbClr val="2196F3"/>
-              </a:solidFill>
-              <a:latin typeface="Segoe UI" panose="020B0502040204020203" pitchFamily="34" charset="0"/>
-              <a:cs typeface="Segoe UI" panose="020B0502040204020203" pitchFamily="34" charset="0"/>
-            </a:endParaRPr>
-          </a:p>
-          <a:p>
-            <a:pPr marL="457200" lvl="1" indent="0">
-              <a:buNone/>
-            </a:pPr>
-            <a:r>
-              <a:rPr lang="en-GB" sz="4800" dirty="0">
-                <a:solidFill>
-                  <a:srgbClr val="2196F3"/>
-                </a:solidFill>
-                <a:latin typeface="Segoe UI" panose="020B0502040204020203" pitchFamily="34" charset="0"/>
-                <a:cs typeface="Segoe UI" panose="020B0502040204020203" pitchFamily="34" charset="0"/>
-              </a:rPr>
-              <a:t>Craig West</a:t>
-            </a:r>
-          </a:p>
-          <a:p>
-            <a:pPr marL="457200" lvl="1" indent="0">
-              <a:buNone/>
-            </a:pPr>
-            <a:endParaRPr lang="en-GB" sz="1100" dirty="0">
-              <a:solidFill>
-                <a:srgbClr val="2196F3"/>
-              </a:solidFill>
-              <a:latin typeface="Segoe UI" panose="020B0502040204020203" pitchFamily="34" charset="0"/>
-              <a:cs typeface="Segoe UI" panose="020B0502040204020203" pitchFamily="34" charset="0"/>
-            </a:endParaRPr>
-          </a:p>
-          <a:p>
-            <a:pPr marL="457200" lvl="1" indent="0">
-              <a:buNone/>
-            </a:pPr>
-            <a:r>
-              <a:rPr lang="en-GB" sz="4000" dirty="0">
-                <a:solidFill>
-                  <a:srgbClr val="2196F3"/>
-                </a:solidFill>
-                <a:latin typeface="Segoe UI" panose="020B0502040204020203" pitchFamily="34" charset="0"/>
-                <a:cs typeface="Segoe UI" panose="020B0502040204020203" pitchFamily="34" charset="0"/>
-              </a:rPr>
-              <a:t>Feel free to contact me: </a:t>
-            </a:r>
-            <a:r>
-              <a:rPr lang="en-GB" sz="4000" b="1" dirty="0">
-                <a:solidFill>
-                  <a:srgbClr val="FFC000"/>
-                </a:solidFill>
-                <a:latin typeface="Segoe UI" panose="020B0502040204020203" pitchFamily="34" charset="0"/>
-                <a:cs typeface="Segoe UI" panose="020B0502040204020203" pitchFamily="34" charset="0"/>
-                <a:hlinkClick r:id="rId2"/>
-              </a:rPr>
-              <a:t>craig@wpjs.co.uk</a:t>
-            </a:r>
-            <a:endParaRPr lang="en-GB" sz="4000" b="1" dirty="0">
-              <a:solidFill>
-                <a:srgbClr val="FFC000"/>
-              </a:solidFill>
-              <a:latin typeface="Segoe UI" panose="020B0502040204020203" pitchFamily="34" charset="0"/>
-              <a:cs typeface="Segoe UI" panose="020B0502040204020203" pitchFamily="34" charset="0"/>
-            </a:endParaRPr>
-          </a:p>
-          <a:p>
-            <a:pPr marL="457200" lvl="1" indent="0">
-              <a:buNone/>
-            </a:pPr>
-            <a:endParaRPr lang="en-GB" sz="4000" b="1" dirty="0">
-              <a:solidFill>
-                <a:srgbClr val="FFC000"/>
-              </a:solidFill>
-              <a:latin typeface="Segoe UI" panose="020B0502040204020203" pitchFamily="34" charset="0"/>
-              <a:cs typeface="Segoe UI" panose="020B0502040204020203" pitchFamily="34" charset="0"/>
-            </a:endParaRPr>
-          </a:p>
-          <a:p>
-            <a:pPr marL="457200" lvl="1" indent="0">
-              <a:buNone/>
-            </a:pPr>
-            <a:endParaRPr lang="en-GB" sz="300" dirty="0">
-              <a:solidFill>
-                <a:srgbClr val="2196F3"/>
-              </a:solidFill>
-              <a:latin typeface="Segoe UI" panose="020B0502040204020203" pitchFamily="34" charset="0"/>
-              <a:cs typeface="Segoe UI" panose="020B0502040204020203" pitchFamily="34" charset="0"/>
-            </a:endParaRPr>
-          </a:p>
-          <a:p>
-            <a:pPr marL="457200" lvl="1" indent="0">
-              <a:buNone/>
-            </a:pPr>
-            <a:r>
-              <a:rPr lang="en-GB" b="1" dirty="0">
-                <a:solidFill>
-                  <a:srgbClr val="2196F3"/>
-                </a:solidFill>
-                <a:latin typeface="Segoe UI" panose="020B0502040204020203" pitchFamily="34" charset="0"/>
-                <a:cs typeface="Segoe UI" panose="020B0502040204020203" pitchFamily="34" charset="0"/>
-              </a:rPr>
-              <a:t>RESOURCE PACK:</a:t>
-            </a:r>
-          </a:p>
-          <a:p>
-            <a:pPr marL="457200" lvl="1" indent="0">
-              <a:buNone/>
-            </a:pPr>
-            <a:endParaRPr lang="en-GB" sz="200" b="1" dirty="0">
-              <a:solidFill>
-                <a:srgbClr val="2196F3"/>
-              </a:solidFill>
-              <a:latin typeface="Segoe UI" panose="020B0502040204020203" pitchFamily="34" charset="0"/>
-              <a:cs typeface="Segoe UI" panose="020B0502040204020203" pitchFamily="34" charset="0"/>
-            </a:endParaRPr>
-          </a:p>
-          <a:p>
-            <a:pPr lvl="1"/>
-            <a:r>
-              <a:rPr lang="en-GB" u="sng" dirty="0">
-                <a:hlinkClick r:id="rId3"/>
-              </a:rPr>
-              <a:t>https://www.wpjs.co.uk/rest.zip</a:t>
-            </a:r>
-            <a:endParaRPr lang="en-GB" sz="1600" dirty="0"/>
-          </a:p>
-          <a:p>
-            <a:pPr lvl="1"/>
-            <a:r>
-              <a:rPr lang="en-GB" u="sng" dirty="0"/>
-              <a:t>https://github.com/iwswordpress/rest</a:t>
-            </a:r>
-            <a:endParaRPr lang="en-GB" sz="1600" dirty="0"/>
-          </a:p>
-          <a:p>
-            <a:pPr marL="457200" lvl="1" indent="0">
-              <a:buNone/>
-            </a:pPr>
-            <a:endParaRPr lang="en-GB" sz="1100" b="1" dirty="0">
-              <a:solidFill>
-                <a:srgbClr val="2196F3"/>
-              </a:solidFill>
-              <a:latin typeface="Segoe UI" panose="020B0502040204020203" pitchFamily="34" charset="0"/>
-              <a:cs typeface="Segoe UI" panose="020B0502040204020203" pitchFamily="34" charset="0"/>
-            </a:endParaRPr>
-          </a:p>
-          <a:p>
-            <a:pPr lvl="1"/>
-            <a:r>
-              <a:rPr lang="en-GB" dirty="0">
-                <a:solidFill>
-                  <a:srgbClr val="2196F3"/>
-                </a:solidFill>
-                <a:latin typeface="Segoe UI" panose="020B0502040204020203" pitchFamily="34" charset="0"/>
-                <a:cs typeface="Segoe UI" panose="020B0502040204020203" pitchFamily="34" charset="0"/>
-              </a:rPr>
-              <a:t>Course files</a:t>
-            </a:r>
-          </a:p>
-          <a:p>
-            <a:pPr lvl="1"/>
-            <a:r>
-              <a:rPr lang="en-GB" dirty="0">
-                <a:solidFill>
-                  <a:srgbClr val="2196F3"/>
-                </a:solidFill>
-                <a:latin typeface="Segoe UI" panose="020B0502040204020203" pitchFamily="34" charset="0"/>
-                <a:cs typeface="Segoe UI" panose="020B0502040204020203" pitchFamily="34" charset="0"/>
-              </a:rPr>
-              <a:t>Slides </a:t>
-            </a:r>
-          </a:p>
-          <a:p>
-            <a:pPr lvl="1"/>
-            <a:r>
-              <a:rPr lang="en-GB" dirty="0">
-                <a:solidFill>
-                  <a:srgbClr val="2196F3"/>
-                </a:solidFill>
-                <a:latin typeface="Segoe UI" panose="020B0502040204020203" pitchFamily="34" charset="0"/>
-                <a:cs typeface="Segoe UI" panose="020B0502040204020203" pitchFamily="34" charset="0"/>
-              </a:rPr>
-              <a:t>Handbook</a:t>
-            </a:r>
-          </a:p>
-          <a:p>
-            <a:pPr marL="457200" lvl="1" indent="0">
-              <a:buNone/>
-            </a:pPr>
-            <a:endParaRPr lang="en-GB" sz="6700" dirty="0">
-              <a:solidFill>
-                <a:srgbClr val="2196F3"/>
-              </a:solidFill>
-              <a:latin typeface="Segoe UI" panose="020B0502040204020203" pitchFamily="34" charset="0"/>
-              <a:cs typeface="Segoe UI" panose="020B0502040204020203" pitchFamily="34" charset="0"/>
-            </a:endParaRPr>
-          </a:p>
-          <a:p>
-            <a:pPr marL="457200" lvl="1" indent="0">
-              <a:buNone/>
-            </a:pPr>
-            <a:endParaRPr lang="en-GB" sz="6700" dirty="0">
-              <a:solidFill>
-                <a:srgbClr val="2196F3"/>
-              </a:solidFill>
-              <a:latin typeface="Segoe UI" panose="020B0502040204020203" pitchFamily="34" charset="0"/>
-              <a:cs typeface="Segoe UI" panose="020B0502040204020203" pitchFamily="34" charset="0"/>
-            </a:endParaRPr>
-          </a:p>
-          <a:p>
-            <a:pPr marL="457200" lvl="1" indent="0">
-              <a:buNone/>
-            </a:pPr>
-            <a:endParaRPr lang="en-GB" sz="6700" dirty="0">
-              <a:latin typeface="Segoe UI" panose="020B0502040204020203" pitchFamily="34" charset="0"/>
-              <a:cs typeface="Segoe UI" panose="020B0502040204020203" pitchFamily="34" charset="0"/>
-            </a:endParaRPr>
-          </a:p>
-          <a:p>
-            <a:pPr marL="0" indent="0">
-              <a:buNone/>
-            </a:pPr>
-            <a:endParaRPr lang="en-GB" dirty="0">
-              <a:latin typeface="Segoe UI" panose="020B0502040204020203" pitchFamily="34" charset="0"/>
-              <a:cs typeface="Segoe UI" panose="020B0502040204020203" pitchFamily="34" charset="0"/>
-            </a:endParaRPr>
-          </a:p>
-          <a:p>
-            <a:endParaRPr lang="en-GB" dirty="0">
-              <a:latin typeface="Segoe UI" panose="020B0502040204020203" pitchFamily="34" charset="0"/>
-              <a:cs typeface="Segoe UI" panose="020B0502040204020203" pitchFamily="34" charset="0"/>
-            </a:endParaRPr>
-          </a:p>
-        </p:txBody>
-      </p:sp>
-    </p:spTree>
-    <p:extLst>
-      <p:ext uri="{BB962C8B-B14F-4D97-AF65-F5344CB8AC3E}">
-        <p14:creationId xmlns:p14="http://schemas.microsoft.com/office/powerpoint/2010/main" val="3383767616"/>
-      </p:ext>
-    </p:extLst>
-  </p:cSld>
-  <p:clrMapOvr>
-    <a:masterClrMapping/>
-  </p:clrMapOvr>
-</p:sld>
-</file>
-
 <file path=ppt/slides/slide2.xml><?xml version="1.0" encoding="utf-8"?>
 <p:sld xmlns:a="http://schemas.openxmlformats.org/drawingml/2006/main" xmlns:r="http://schemas.openxmlformats.org/officeDocument/2006/relationships" xmlns:p="http://schemas.openxmlformats.org/presentationml/2006/main">
   <p:cSld>
@@ -5529,7 +5162,7 @@
         </p:blipFill>
         <p:spPr bwMode="auto">
           <a:xfrm>
-            <a:off x="8320957" y="4122993"/>
+            <a:off x="8303598" y="4132270"/>
             <a:ext cx="3525929" cy="2367777"/>
           </a:xfrm>
           <a:prstGeom prst="rect">
@@ -5715,97 +5348,10 @@
           </a:p>
         </p:txBody>
       </p:sp>
-      <p:cxnSp>
-        <p:nvCxnSpPr>
-          <p:cNvPr id="9" name="Straight Arrow Connector 8">
-            <a:extLst>
-              <a:ext uri="{FF2B5EF4-FFF2-40B4-BE49-F238E27FC236}">
-                <a16:creationId xmlns:a16="http://schemas.microsoft.com/office/drawing/2014/main" id="{CF93C976-3C1F-4C74-9D39-90DABBE18BB7}"/>
-              </a:ext>
-            </a:extLst>
-          </p:cNvPr>
-          <p:cNvCxnSpPr>
-            <a:cxnSpLocks/>
-          </p:cNvCxnSpPr>
-          <p:nvPr/>
-        </p:nvCxnSpPr>
-        <p:spPr>
-          <a:xfrm flipH="1" flipV="1">
-            <a:off x="8672218" y="4142117"/>
-            <a:ext cx="682807" cy="748283"/>
-          </a:xfrm>
-          <a:prstGeom prst="straightConnector1">
-            <a:avLst/>
-          </a:prstGeom>
-          <a:ln w="50800">
-            <a:solidFill>
-              <a:schemeClr val="bg1"/>
-            </a:solidFill>
-            <a:tailEnd type="triangle"/>
-          </a:ln>
-        </p:spPr>
-        <p:style>
-          <a:lnRef idx="3">
-            <a:schemeClr val="accent1"/>
-          </a:lnRef>
-          <a:fillRef idx="0">
-            <a:schemeClr val="accent1"/>
-          </a:fillRef>
-          <a:effectRef idx="2">
-            <a:schemeClr val="accent1"/>
-          </a:effectRef>
-          <a:fontRef idx="minor">
-            <a:schemeClr val="tx1"/>
-          </a:fontRef>
-        </p:style>
-      </p:cxnSp>
-      <p:sp>
-        <p:nvSpPr>
-          <p:cNvPr id="10" name="TextBox 9">
-            <a:extLst>
-              <a:ext uri="{FF2B5EF4-FFF2-40B4-BE49-F238E27FC236}">
-                <a16:creationId xmlns:a16="http://schemas.microsoft.com/office/drawing/2014/main" id="{C6D2AB8D-F566-4A3A-ABB8-05B92FD0E743}"/>
-              </a:ext>
-            </a:extLst>
-          </p:cNvPr>
-          <p:cNvSpPr txBox="1"/>
-          <p:nvPr/>
-        </p:nvSpPr>
-        <p:spPr>
-          <a:xfrm>
-            <a:off x="8066040" y="5058423"/>
-            <a:ext cx="1845578" cy="369332"/>
-          </a:xfrm>
-          <a:prstGeom prst="rect">
-            <a:avLst/>
-          </a:prstGeom>
-          <a:noFill/>
-        </p:spPr>
-        <p:txBody>
-          <a:bodyPr wrap="square" rtlCol="0">
-            <a:spAutoFit/>
-          </a:bodyPr>
-          <a:lstStyle/>
-          <a:p>
-            <a:pPr algn="ctr"/>
-            <a:r>
-              <a:rPr lang="en-GB" dirty="0">
-                <a:solidFill>
-                  <a:schemeClr val="bg1"/>
-                </a:solidFill>
-                <a:highlight>
-                  <a:srgbClr val="0000FF"/>
-                </a:highlight>
-              </a:rPr>
-              <a:t>15 min walk</a:t>
-            </a:r>
-          </a:p>
-        </p:txBody>
-      </p:sp>
     </p:spTree>
     <p:extLst>
       <p:ext uri="{BB962C8B-B14F-4D97-AF65-F5344CB8AC3E}">
-        <p14:creationId xmlns:p14="http://schemas.microsoft.com/office/powerpoint/2010/main" val="138352021"/>
+        <p14:creationId xmlns:p14="http://schemas.microsoft.com/office/powerpoint/2010/main" val="2449607764"/>
       </p:ext>
     </p:extLst>
   </p:cSld>

</xml_diff>

<commit_message>
ADD WP-HTML to slides
</commit_message>
<xml_diff>
--- a/rest-api-workshop.pptx
+++ b/rest-api-workshop.pptx
@@ -5,7 +5,7 @@
     <p:sldMasterId id="2147483648" r:id="rId1"/>
   </p:sldMasterIdLst>
   <p:notesMasterIdLst>
-    <p:notesMasterId r:id="rId13"/>
+    <p:notesMasterId r:id="rId19"/>
   </p:notesMasterIdLst>
   <p:sldIdLst>
     <p:sldId id="264" r:id="rId2"/>
@@ -19,6 +19,12 @@
     <p:sldId id="300" r:id="rId10"/>
     <p:sldId id="301" r:id="rId11"/>
     <p:sldId id="302" r:id="rId12"/>
+    <p:sldId id="312" r:id="rId13"/>
+    <p:sldId id="305" r:id="rId14"/>
+    <p:sldId id="308" r:id="rId15"/>
+    <p:sldId id="309" r:id="rId16"/>
+    <p:sldId id="310" r:id="rId17"/>
+    <p:sldId id="311" r:id="rId18"/>
   </p:sldIdLst>
   <p:sldSz cx="12192000" cy="6858000"/>
   <p:notesSz cx="6858000" cy="9144000"/>
@@ -133,6 +139,12 @@
             <p14:sldId id="300"/>
             <p14:sldId id="301"/>
             <p14:sldId id="302"/>
+            <p14:sldId id="312"/>
+            <p14:sldId id="305"/>
+            <p14:sldId id="308"/>
+            <p14:sldId id="309"/>
+            <p14:sldId id="310"/>
+            <p14:sldId id="311"/>
           </p14:sldIdLst>
         </p14:section>
       </p14:sectionLst>
@@ -245,7 +257,7 @@
           <a:p>
             <a:fld id="{70FE56F2-0B60-44FC-AC55-491897A4F355}" type="datetimeFigureOut">
               <a:rPr lang="en-GB" smtClean="0"/>
-              <a:t>21/05/2020</a:t>
+              <a:t>24/05/2020</a:t>
             </a:fld>
             <a:endParaRPr lang="en-GB"/>
           </a:p>
@@ -662,7 +674,7 @@
           <a:p>
             <a:fld id="{4D723AB6-704A-42C8-AB51-31B091223600}" type="datetimeFigureOut">
               <a:rPr lang="en-GB" smtClean="0"/>
-              <a:t>21/05/2020</a:t>
+              <a:t>24/05/2020</a:t>
             </a:fld>
             <a:endParaRPr lang="en-GB"/>
           </a:p>
@@ -862,7 +874,7 @@
           <a:p>
             <a:fld id="{4D723AB6-704A-42C8-AB51-31B091223600}" type="datetimeFigureOut">
               <a:rPr lang="en-GB" smtClean="0"/>
-              <a:t>21/05/2020</a:t>
+              <a:t>24/05/2020</a:t>
             </a:fld>
             <a:endParaRPr lang="en-GB"/>
           </a:p>
@@ -1072,7 +1084,7 @@
           <a:p>
             <a:fld id="{4D723AB6-704A-42C8-AB51-31B091223600}" type="datetimeFigureOut">
               <a:rPr lang="en-GB" smtClean="0"/>
-              <a:t>21/05/2020</a:t>
+              <a:t>24/05/2020</a:t>
             </a:fld>
             <a:endParaRPr lang="en-GB"/>
           </a:p>
@@ -1272,7 +1284,7 @@
           <a:p>
             <a:fld id="{4D723AB6-704A-42C8-AB51-31B091223600}" type="datetimeFigureOut">
               <a:rPr lang="en-GB" smtClean="0"/>
-              <a:t>21/05/2020</a:t>
+              <a:t>24/05/2020</a:t>
             </a:fld>
             <a:endParaRPr lang="en-GB"/>
           </a:p>
@@ -1548,7 +1560,7 @@
           <a:p>
             <a:fld id="{4D723AB6-704A-42C8-AB51-31B091223600}" type="datetimeFigureOut">
               <a:rPr lang="en-GB" smtClean="0"/>
-              <a:t>21/05/2020</a:t>
+              <a:t>24/05/2020</a:t>
             </a:fld>
             <a:endParaRPr lang="en-GB"/>
           </a:p>
@@ -1816,7 +1828,7 @@
           <a:p>
             <a:fld id="{4D723AB6-704A-42C8-AB51-31B091223600}" type="datetimeFigureOut">
               <a:rPr lang="en-GB" smtClean="0"/>
-              <a:t>21/05/2020</a:t>
+              <a:t>24/05/2020</a:t>
             </a:fld>
             <a:endParaRPr lang="en-GB"/>
           </a:p>
@@ -2231,7 +2243,7 @@
           <a:p>
             <a:fld id="{4D723AB6-704A-42C8-AB51-31B091223600}" type="datetimeFigureOut">
               <a:rPr lang="en-GB" smtClean="0"/>
-              <a:t>21/05/2020</a:t>
+              <a:t>24/05/2020</a:t>
             </a:fld>
             <a:endParaRPr lang="en-GB"/>
           </a:p>
@@ -2373,7 +2385,7 @@
           <a:p>
             <a:fld id="{4D723AB6-704A-42C8-AB51-31B091223600}" type="datetimeFigureOut">
               <a:rPr lang="en-GB" smtClean="0"/>
-              <a:t>21/05/2020</a:t>
+              <a:t>24/05/2020</a:t>
             </a:fld>
             <a:endParaRPr lang="en-GB"/>
           </a:p>
@@ -2486,7 +2498,7 @@
           <a:p>
             <a:fld id="{4D723AB6-704A-42C8-AB51-31B091223600}" type="datetimeFigureOut">
               <a:rPr lang="en-GB" smtClean="0"/>
-              <a:t>21/05/2020</a:t>
+              <a:t>24/05/2020</a:t>
             </a:fld>
             <a:endParaRPr lang="en-GB"/>
           </a:p>
@@ -2799,7 +2811,7 @@
           <a:p>
             <a:fld id="{4D723AB6-704A-42C8-AB51-31B091223600}" type="datetimeFigureOut">
               <a:rPr lang="en-GB" smtClean="0"/>
-              <a:t>21/05/2020</a:t>
+              <a:t>24/05/2020</a:t>
             </a:fld>
             <a:endParaRPr lang="en-GB"/>
           </a:p>
@@ -3088,7 +3100,7 @@
           <a:p>
             <a:fld id="{4D723AB6-704A-42C8-AB51-31B091223600}" type="datetimeFigureOut">
               <a:rPr lang="en-GB" smtClean="0"/>
-              <a:t>21/05/2020</a:t>
+              <a:t>24/05/2020</a:t>
             </a:fld>
             <a:endParaRPr lang="en-GB"/>
           </a:p>
@@ -3331,7 +3343,7 @@
           <a:p>
             <a:fld id="{4D723AB6-704A-42C8-AB51-31B091223600}" type="datetimeFigureOut">
               <a:rPr lang="en-GB" smtClean="0"/>
-              <a:t>21/05/2020</a:t>
+              <a:t>24/05/2020</a:t>
             </a:fld>
             <a:endParaRPr lang="en-GB"/>
           </a:p>
@@ -4509,13 +4521,13 @@
         </p:nvSpPr>
         <p:spPr>
           <a:xfrm>
-            <a:off x="838200" y="1775290"/>
-            <a:ext cx="10515600" cy="4399007"/>
+            <a:off x="838200" y="1394692"/>
+            <a:ext cx="10515600" cy="4779606"/>
           </a:xfrm>
         </p:spPr>
         <p:txBody>
           <a:bodyPr wrap="square" bIns="252000">
-            <a:normAutofit lnSpcReduction="10000"/>
+            <a:normAutofit fontScale="92500" lnSpcReduction="10000"/>
           </a:bodyPr>
           <a:lstStyle/>
           <a:p>
@@ -4528,7 +4540,65 @@
                   <a:srgbClr val="2196F3"/>
                 </a:solidFill>
               </a:rPr>
-              <a:t>JSON Data Types</a:t>
+              <a:t>Think of JSON data as an associative array</a:t>
+            </a:r>
+          </a:p>
+          <a:p>
+            <a:pPr marL="457200" lvl="1" indent="0">
+              <a:buNone/>
+            </a:pPr>
+            <a:r>
+              <a:rPr lang="en-GB" sz="3500" dirty="0" err="1">
+                <a:solidFill>
+                  <a:srgbClr val="2196F3"/>
+                </a:solidFill>
+              </a:rPr>
+              <a:t>json_encode</a:t>
+            </a:r>
+            <a:r>
+              <a:rPr lang="en-GB" sz="3500" dirty="0">
+                <a:solidFill>
+                  <a:srgbClr val="2196F3"/>
+                </a:solidFill>
+              </a:rPr>
+              <a:t>([php associative array]) gives JSON</a:t>
+            </a:r>
+          </a:p>
+          <a:p>
+            <a:pPr marL="457200" lvl="1" indent="0">
+              <a:buNone/>
+            </a:pPr>
+            <a:r>
+              <a:rPr lang="en-GB" sz="3500" dirty="0" err="1">
+                <a:solidFill>
+                  <a:srgbClr val="2196F3"/>
+                </a:solidFill>
+              </a:rPr>
+              <a:t>json_decode</a:t>
+            </a:r>
+            <a:r>
+              <a:rPr lang="en-GB" sz="3500" dirty="0">
+                <a:solidFill>
+                  <a:srgbClr val="2196F3"/>
+                </a:solidFill>
+              </a:rPr>
+              <a:t> (JSON) gives an </a:t>
+            </a:r>
+            <a:r>
+              <a:rPr lang="en-GB" sz="3500" dirty="0" err="1">
+                <a:solidFill>
+                  <a:srgbClr val="2196F3"/>
+                </a:solidFill>
+              </a:rPr>
+              <a:t>assoc</a:t>
+            </a:r>
+            <a:r>
+              <a:rPr lang="en-GB" sz="3500" dirty="0">
+                <a:solidFill>
+                  <a:srgbClr val="2196F3"/>
+                </a:solidFill>
+              </a:rPr>
+              <a:t> array</a:t>
             </a:r>
           </a:p>
           <a:p>
@@ -4688,6 +4758,1503 @@
     <p:extLst>
       <p:ext uri="{BB962C8B-B14F-4D97-AF65-F5344CB8AC3E}">
         <p14:creationId xmlns:p14="http://schemas.microsoft.com/office/powerpoint/2010/main" val="3496796182"/>
+      </p:ext>
+    </p:extLst>
+  </p:cSld>
+  <p:clrMapOvr>
+    <a:masterClrMapping/>
+  </p:clrMapOvr>
+</p:sld>
+</file>
+
+<file path=ppt/slides/slide12.xml><?xml version="1.0" encoding="utf-8"?>
+<p:sld xmlns:a="http://schemas.openxmlformats.org/drawingml/2006/main" xmlns:r="http://schemas.openxmlformats.org/officeDocument/2006/relationships" xmlns:p="http://schemas.openxmlformats.org/presentationml/2006/main">
+  <p:cSld>
+    <p:spTree>
+      <p:nvGrpSpPr>
+        <p:cNvPr id="1" name=""/>
+        <p:cNvGrpSpPr/>
+        <p:nvPr/>
+      </p:nvGrpSpPr>
+      <p:grpSpPr>
+        <a:xfrm>
+          <a:off x="0" y="0"/>
+          <a:ext cx="0" cy="0"/>
+          <a:chOff x="0" y="0"/>
+          <a:chExt cx="0" cy="0"/>
+        </a:xfrm>
+      </p:grpSpPr>
+      <p:sp>
+        <p:nvSpPr>
+          <p:cNvPr id="2" name="Title 1">
+            <a:extLst>
+              <a:ext uri="{FF2B5EF4-FFF2-40B4-BE49-F238E27FC236}">
+                <a16:creationId xmlns:a16="http://schemas.microsoft.com/office/drawing/2014/main" id="{5D7568B3-EC9A-45DD-8A17-CFE685194B65}"/>
+              </a:ext>
+            </a:extLst>
+          </p:cNvPr>
+          <p:cNvSpPr>
+            <a:spLocks noGrp="1"/>
+          </p:cNvSpPr>
+          <p:nvPr>
+            <p:ph type="title"/>
+          </p:nvPr>
+        </p:nvSpPr>
+        <p:spPr>
+          <a:xfrm>
+            <a:off x="838200" y="0"/>
+            <a:ext cx="10515600" cy="1325563"/>
+          </a:xfrm>
+          <a:solidFill>
+            <a:srgbClr val="2196F3"/>
+          </a:solidFill>
+        </p:spPr>
+        <p:txBody>
+          <a:bodyPr>
+            <a:normAutofit/>
+          </a:bodyPr>
+          <a:lstStyle/>
+          <a:p>
+            <a:pPr algn="ctr"/>
+            <a:r>
+              <a:rPr lang="en-GB" sz="6600" dirty="0">
+                <a:solidFill>
+                  <a:schemeClr val="bg1"/>
+                </a:solidFill>
+                <a:latin typeface="Segoe UI" panose="020B0502040204020203" pitchFamily="34" charset="0"/>
+                <a:cs typeface="Segoe UI" panose="020B0502040204020203" pitchFamily="34" charset="0"/>
+              </a:rPr>
+              <a:t>WP REST API &amp; AJAX</a:t>
+            </a:r>
+          </a:p>
+        </p:txBody>
+      </p:sp>
+      <p:sp>
+        <p:nvSpPr>
+          <p:cNvPr id="4" name="Content Placeholder 2">
+            <a:extLst>
+              <a:ext uri="{FF2B5EF4-FFF2-40B4-BE49-F238E27FC236}">
+                <a16:creationId xmlns:a16="http://schemas.microsoft.com/office/drawing/2014/main" id="{088CCB65-11B4-408B-9ED3-1304FE85032F}"/>
+              </a:ext>
+            </a:extLst>
+          </p:cNvPr>
+          <p:cNvSpPr>
+            <a:spLocks noGrp="1"/>
+          </p:cNvSpPr>
+          <p:nvPr>
+            <p:ph idx="1"/>
+          </p:nvPr>
+        </p:nvSpPr>
+        <p:spPr>
+          <a:xfrm>
+            <a:off x="838200" y="1431636"/>
+            <a:ext cx="10515600" cy="4742661"/>
+          </a:xfrm>
+        </p:spPr>
+        <p:txBody>
+          <a:bodyPr wrap="square" bIns="252000">
+            <a:normAutofit/>
+          </a:bodyPr>
+          <a:lstStyle/>
+          <a:p>
+            <a:pPr marL="457200" lvl="1" indent="0">
+              <a:buNone/>
+            </a:pPr>
+            <a:endParaRPr lang="en-GB" sz="5100" dirty="0">
+              <a:solidFill>
+                <a:srgbClr val="2196F3"/>
+              </a:solidFill>
+              <a:latin typeface="Segoe UI" panose="020B0502040204020203" pitchFamily="34" charset="0"/>
+              <a:cs typeface="Segoe UI" panose="020B0502040204020203" pitchFamily="34" charset="0"/>
+            </a:endParaRPr>
+          </a:p>
+          <a:p>
+            <a:pPr marL="457200" lvl="1" indent="0">
+              <a:buNone/>
+            </a:pPr>
+            <a:r>
+              <a:rPr lang="en-GB" sz="5100" dirty="0">
+                <a:solidFill>
+                  <a:srgbClr val="FF0000"/>
+                </a:solidFill>
+                <a:latin typeface="Segoe UI" panose="020B0502040204020203" pitchFamily="34" charset="0"/>
+                <a:cs typeface="Segoe UI" panose="020B0502040204020203" pitchFamily="34" charset="0"/>
+              </a:rPr>
+              <a:t>WP REST API + Web Components</a:t>
+            </a:r>
+          </a:p>
+          <a:p>
+            <a:pPr lvl="1">
+              <a:buFont typeface="Symbol" panose="05050102010706020507" pitchFamily="18" charset="2"/>
+              <a:buChar char="Þ"/>
+            </a:pPr>
+            <a:r>
+              <a:rPr lang="en-GB" sz="5100" dirty="0">
+                <a:solidFill>
+                  <a:srgbClr val="FF0000"/>
+                </a:solidFill>
+                <a:latin typeface="Segoe UI" panose="020B0502040204020203" pitchFamily="34" charset="0"/>
+                <a:cs typeface="Segoe UI" panose="020B0502040204020203" pitchFamily="34" charset="0"/>
+              </a:rPr>
+              <a:t> </a:t>
+            </a:r>
+            <a:r>
+              <a:rPr lang="en-GB" sz="5100" b="1" dirty="0">
+                <a:solidFill>
+                  <a:srgbClr val="FF0000"/>
+                </a:solidFill>
+                <a:latin typeface="Segoe UI" panose="020B0502040204020203" pitchFamily="34" charset="0"/>
+                <a:cs typeface="Segoe UI" panose="020B0502040204020203" pitchFamily="34" charset="0"/>
+              </a:rPr>
+              <a:t>HTML Plugins</a:t>
+            </a:r>
+          </a:p>
+          <a:p>
+            <a:pPr lvl="1">
+              <a:buFont typeface="Symbol" panose="05050102010706020507" pitchFamily="18" charset="2"/>
+              <a:buChar char="Þ"/>
+            </a:pPr>
+            <a:r>
+              <a:rPr lang="en-GB" sz="5100" dirty="0">
+                <a:solidFill>
+                  <a:srgbClr val="FF0000"/>
+                </a:solidFill>
+                <a:latin typeface="Segoe UI" panose="020B0502040204020203" pitchFamily="34" charset="0"/>
+                <a:cs typeface="Segoe UI" panose="020B0502040204020203" pitchFamily="34" charset="0"/>
+              </a:rPr>
+              <a:t> </a:t>
+            </a:r>
+            <a:r>
+              <a:rPr lang="en-GB" sz="5100" b="1" dirty="0">
+                <a:solidFill>
+                  <a:srgbClr val="FF0000"/>
+                </a:solidFill>
+                <a:latin typeface="Segoe UI" panose="020B0502040204020203" pitchFamily="34" charset="0"/>
+                <a:cs typeface="Segoe UI" panose="020B0502040204020203" pitchFamily="34" charset="0"/>
+              </a:rPr>
+              <a:t>100% Internet</a:t>
+            </a:r>
+          </a:p>
+          <a:p>
+            <a:pPr marL="457200" lvl="1" indent="0">
+              <a:buNone/>
+            </a:pPr>
+            <a:endParaRPr lang="en-GB" sz="1050" dirty="0">
+              <a:solidFill>
+                <a:srgbClr val="2196F3"/>
+              </a:solidFill>
+              <a:latin typeface="Segoe UI" panose="020B0502040204020203" pitchFamily="34" charset="0"/>
+              <a:cs typeface="Segoe UI" panose="020B0502040204020203" pitchFamily="34" charset="0"/>
+            </a:endParaRPr>
+          </a:p>
+          <a:p>
+            <a:pPr marL="457200" lvl="1" indent="0">
+              <a:buNone/>
+            </a:pPr>
+            <a:endParaRPr lang="en-GB" sz="6700" dirty="0">
+              <a:solidFill>
+                <a:srgbClr val="2196F3"/>
+              </a:solidFill>
+              <a:latin typeface="Segoe UI" panose="020B0502040204020203" pitchFamily="34" charset="0"/>
+              <a:cs typeface="Segoe UI" panose="020B0502040204020203" pitchFamily="34" charset="0"/>
+            </a:endParaRPr>
+          </a:p>
+          <a:p>
+            <a:pPr marL="457200" lvl="1" indent="0">
+              <a:buNone/>
+            </a:pPr>
+            <a:endParaRPr lang="en-GB" sz="6700" dirty="0">
+              <a:solidFill>
+                <a:srgbClr val="2196F3"/>
+              </a:solidFill>
+              <a:latin typeface="Segoe UI" panose="020B0502040204020203" pitchFamily="34" charset="0"/>
+              <a:cs typeface="Segoe UI" panose="020B0502040204020203" pitchFamily="34" charset="0"/>
+            </a:endParaRPr>
+          </a:p>
+          <a:p>
+            <a:pPr marL="457200" lvl="1" indent="0">
+              <a:buNone/>
+            </a:pPr>
+            <a:endParaRPr lang="en-GB" sz="6700" dirty="0">
+              <a:latin typeface="Segoe UI" panose="020B0502040204020203" pitchFamily="34" charset="0"/>
+              <a:cs typeface="Segoe UI" panose="020B0502040204020203" pitchFamily="34" charset="0"/>
+            </a:endParaRPr>
+          </a:p>
+          <a:p>
+            <a:pPr marL="0" indent="0">
+              <a:buNone/>
+            </a:pPr>
+            <a:endParaRPr lang="en-GB" dirty="0">
+              <a:latin typeface="Segoe UI" panose="020B0502040204020203" pitchFamily="34" charset="0"/>
+              <a:cs typeface="Segoe UI" panose="020B0502040204020203" pitchFamily="34" charset="0"/>
+            </a:endParaRPr>
+          </a:p>
+          <a:p>
+            <a:endParaRPr lang="en-GB" dirty="0">
+              <a:latin typeface="Segoe UI" panose="020B0502040204020203" pitchFamily="34" charset="0"/>
+              <a:cs typeface="Segoe UI" panose="020B0502040204020203" pitchFamily="34" charset="0"/>
+            </a:endParaRPr>
+          </a:p>
+        </p:txBody>
+      </p:sp>
+    </p:spTree>
+    <p:extLst>
+      <p:ext uri="{BB962C8B-B14F-4D97-AF65-F5344CB8AC3E}">
+        <p14:creationId xmlns:p14="http://schemas.microsoft.com/office/powerpoint/2010/main" val="1203899647"/>
+      </p:ext>
+    </p:extLst>
+  </p:cSld>
+  <p:clrMapOvr>
+    <a:masterClrMapping/>
+  </p:clrMapOvr>
+</p:sld>
+</file>
+
+<file path=ppt/slides/slide13.xml><?xml version="1.0" encoding="utf-8"?>
+<p:sld xmlns:a="http://schemas.openxmlformats.org/drawingml/2006/main" xmlns:r="http://schemas.openxmlformats.org/officeDocument/2006/relationships" xmlns:p="http://schemas.openxmlformats.org/presentationml/2006/main">
+  <p:cSld>
+    <p:spTree>
+      <p:nvGrpSpPr>
+        <p:cNvPr id="1" name=""/>
+        <p:cNvGrpSpPr/>
+        <p:nvPr/>
+      </p:nvGrpSpPr>
+      <p:grpSpPr>
+        <a:xfrm>
+          <a:off x="0" y="0"/>
+          <a:ext cx="0" cy="0"/>
+          <a:chOff x="0" y="0"/>
+          <a:chExt cx="0" cy="0"/>
+        </a:xfrm>
+      </p:grpSpPr>
+      <p:sp>
+        <p:nvSpPr>
+          <p:cNvPr id="2" name="Title 1">
+            <a:extLst>
+              <a:ext uri="{FF2B5EF4-FFF2-40B4-BE49-F238E27FC236}">
+                <a16:creationId xmlns:a16="http://schemas.microsoft.com/office/drawing/2014/main" id="{5D7568B3-EC9A-45DD-8A17-CFE685194B65}"/>
+              </a:ext>
+            </a:extLst>
+          </p:cNvPr>
+          <p:cNvSpPr>
+            <a:spLocks noGrp="1"/>
+          </p:cNvSpPr>
+          <p:nvPr>
+            <p:ph type="title"/>
+          </p:nvPr>
+        </p:nvSpPr>
+        <p:spPr>
+          <a:xfrm>
+            <a:off x="838200" y="0"/>
+            <a:ext cx="10515600" cy="1325563"/>
+          </a:xfrm>
+          <a:solidFill>
+            <a:srgbClr val="2196F3"/>
+          </a:solidFill>
+        </p:spPr>
+        <p:txBody>
+          <a:bodyPr>
+            <a:normAutofit/>
+          </a:bodyPr>
+          <a:lstStyle/>
+          <a:p>
+            <a:pPr algn="ctr"/>
+            <a:r>
+              <a:rPr lang="en-GB" sz="6600" dirty="0">
+                <a:solidFill>
+                  <a:schemeClr val="bg1"/>
+                </a:solidFill>
+                <a:latin typeface="Segoe UI" panose="020B0502040204020203" pitchFamily="34" charset="0"/>
+                <a:cs typeface="Segoe UI" panose="020B0502040204020203" pitchFamily="34" charset="0"/>
+              </a:rPr>
+              <a:t>WP REST API &amp; AJAX</a:t>
+            </a:r>
+          </a:p>
+        </p:txBody>
+      </p:sp>
+      <p:sp>
+        <p:nvSpPr>
+          <p:cNvPr id="4" name="Content Placeholder 2">
+            <a:extLst>
+              <a:ext uri="{FF2B5EF4-FFF2-40B4-BE49-F238E27FC236}">
+                <a16:creationId xmlns:a16="http://schemas.microsoft.com/office/drawing/2014/main" id="{088CCB65-11B4-408B-9ED3-1304FE85032F}"/>
+              </a:ext>
+            </a:extLst>
+          </p:cNvPr>
+          <p:cNvSpPr>
+            <a:spLocks noGrp="1"/>
+          </p:cNvSpPr>
+          <p:nvPr>
+            <p:ph idx="1"/>
+          </p:nvPr>
+        </p:nvSpPr>
+        <p:spPr>
+          <a:xfrm>
+            <a:off x="838200" y="1431636"/>
+            <a:ext cx="10515600" cy="4742661"/>
+          </a:xfrm>
+        </p:spPr>
+        <p:txBody>
+          <a:bodyPr wrap="square" bIns="252000">
+            <a:normAutofit/>
+          </a:bodyPr>
+          <a:lstStyle/>
+          <a:p>
+            <a:pPr marL="457200" lvl="1" indent="0">
+              <a:buNone/>
+            </a:pPr>
+            <a:r>
+              <a:rPr lang="en-GB" sz="5100" dirty="0">
+                <a:solidFill>
+                  <a:srgbClr val="2196F3"/>
+                </a:solidFill>
+                <a:latin typeface="Segoe UI" panose="020B0502040204020203" pitchFamily="34" charset="0"/>
+                <a:cs typeface="Segoe UI" panose="020B0502040204020203" pitchFamily="34" charset="0"/>
+              </a:rPr>
+              <a:t>DECOUPLED WP</a:t>
+            </a:r>
+          </a:p>
+          <a:p>
+            <a:pPr marL="457200" lvl="1" indent="0">
+              <a:buNone/>
+            </a:pPr>
+            <a:endParaRPr lang="en-GB" sz="1050" dirty="0">
+              <a:solidFill>
+                <a:srgbClr val="2196F3"/>
+              </a:solidFill>
+              <a:latin typeface="Segoe UI" panose="020B0502040204020203" pitchFamily="34" charset="0"/>
+              <a:cs typeface="Segoe UI" panose="020B0502040204020203" pitchFamily="34" charset="0"/>
+            </a:endParaRPr>
+          </a:p>
+          <a:p>
+            <a:pPr lvl="1"/>
+            <a:r>
+              <a:rPr lang="en-GB" sz="2800" dirty="0">
+                <a:solidFill>
+                  <a:srgbClr val="2196F3"/>
+                </a:solidFill>
+                <a:latin typeface="Segoe UI" panose="020B0502040204020203" pitchFamily="34" charset="0"/>
+                <a:cs typeface="Segoe UI" panose="020B0502040204020203" pitchFamily="34" charset="0"/>
+              </a:rPr>
+              <a:t>As we are using JS blocks in our PHP pages this can lead to using these scripts in HTML pages or PHP outside of the WP ecosystem.</a:t>
+            </a:r>
+          </a:p>
+          <a:p>
+            <a:pPr lvl="1"/>
+            <a:r>
+              <a:rPr lang="en-GB" sz="2800" dirty="0">
+                <a:solidFill>
+                  <a:srgbClr val="2196F3"/>
+                </a:solidFill>
+                <a:latin typeface="Segoe UI" panose="020B0502040204020203" pitchFamily="34" charset="0"/>
+                <a:cs typeface="Segoe UI" panose="020B0502040204020203" pitchFamily="34" charset="0"/>
+              </a:rPr>
+              <a:t>This means we can have DECOUPLED or HEADLESS WP sites</a:t>
+            </a:r>
+          </a:p>
+          <a:p>
+            <a:pPr lvl="1"/>
+            <a:r>
+              <a:rPr lang="en-GB" sz="2800" dirty="0">
+                <a:solidFill>
+                  <a:srgbClr val="2196F3"/>
+                </a:solidFill>
+                <a:latin typeface="Segoe UI" panose="020B0502040204020203" pitchFamily="34" charset="0"/>
+                <a:cs typeface="Segoe UI" panose="020B0502040204020203" pitchFamily="34" charset="0"/>
+              </a:rPr>
+              <a:t>HEADLESS means formatting preconfigured.</a:t>
+            </a:r>
+          </a:p>
+          <a:p>
+            <a:pPr lvl="1"/>
+            <a:r>
+              <a:rPr lang="en-GB" sz="2800" dirty="0">
+                <a:solidFill>
+                  <a:srgbClr val="2196F3"/>
+                </a:solidFill>
+                <a:latin typeface="Segoe UI" panose="020B0502040204020203" pitchFamily="34" charset="0"/>
+                <a:cs typeface="Segoe UI" panose="020B0502040204020203" pitchFamily="34" charset="0"/>
+              </a:rPr>
+              <a:t>DECOUPLED means data is sent and page formats data.</a:t>
+            </a:r>
+          </a:p>
+          <a:p>
+            <a:pPr lvl="1"/>
+            <a:r>
+              <a:rPr lang="en-GB" sz="2800" dirty="0">
+                <a:solidFill>
+                  <a:srgbClr val="2196F3"/>
+                </a:solidFill>
+                <a:latin typeface="Segoe UI" panose="020B0502040204020203" pitchFamily="34" charset="0"/>
+                <a:cs typeface="Segoe UI" panose="020B0502040204020203" pitchFamily="34" charset="0"/>
+              </a:rPr>
+              <a:t>Using JSON WEB TOKENS (JWT) we can also authenticate…</a:t>
+            </a:r>
+          </a:p>
+          <a:p>
+            <a:pPr lvl="1"/>
+            <a:r>
+              <a:rPr lang="en-GB" sz="2800" dirty="0">
+                <a:solidFill>
+                  <a:srgbClr val="2196F3"/>
+                </a:solidFill>
+                <a:latin typeface="Segoe UI" panose="020B0502040204020203" pitchFamily="34" charset="0"/>
+                <a:cs typeface="Segoe UI" panose="020B0502040204020203" pitchFamily="34" charset="0"/>
+              </a:rPr>
+              <a:t>Example: https://wp-html.co.uk/semantic</a:t>
+            </a:r>
+          </a:p>
+          <a:p>
+            <a:pPr marL="457200" lvl="1" indent="0">
+              <a:buNone/>
+            </a:pPr>
+            <a:endParaRPr lang="en-GB" sz="6700" dirty="0">
+              <a:solidFill>
+                <a:srgbClr val="2196F3"/>
+              </a:solidFill>
+              <a:latin typeface="Segoe UI" panose="020B0502040204020203" pitchFamily="34" charset="0"/>
+              <a:cs typeface="Segoe UI" panose="020B0502040204020203" pitchFamily="34" charset="0"/>
+            </a:endParaRPr>
+          </a:p>
+          <a:p>
+            <a:pPr marL="457200" lvl="1" indent="0">
+              <a:buNone/>
+            </a:pPr>
+            <a:endParaRPr lang="en-GB" sz="6700" dirty="0">
+              <a:solidFill>
+                <a:srgbClr val="2196F3"/>
+              </a:solidFill>
+              <a:latin typeface="Segoe UI" panose="020B0502040204020203" pitchFamily="34" charset="0"/>
+              <a:cs typeface="Segoe UI" panose="020B0502040204020203" pitchFamily="34" charset="0"/>
+            </a:endParaRPr>
+          </a:p>
+          <a:p>
+            <a:pPr marL="457200" lvl="1" indent="0">
+              <a:buNone/>
+            </a:pPr>
+            <a:endParaRPr lang="en-GB" sz="6700" dirty="0">
+              <a:latin typeface="Segoe UI" panose="020B0502040204020203" pitchFamily="34" charset="0"/>
+              <a:cs typeface="Segoe UI" panose="020B0502040204020203" pitchFamily="34" charset="0"/>
+            </a:endParaRPr>
+          </a:p>
+          <a:p>
+            <a:pPr marL="0" indent="0">
+              <a:buNone/>
+            </a:pPr>
+            <a:endParaRPr lang="en-GB" dirty="0">
+              <a:latin typeface="Segoe UI" panose="020B0502040204020203" pitchFamily="34" charset="0"/>
+              <a:cs typeface="Segoe UI" panose="020B0502040204020203" pitchFamily="34" charset="0"/>
+            </a:endParaRPr>
+          </a:p>
+          <a:p>
+            <a:endParaRPr lang="en-GB" dirty="0">
+              <a:latin typeface="Segoe UI" panose="020B0502040204020203" pitchFamily="34" charset="0"/>
+              <a:cs typeface="Segoe UI" panose="020B0502040204020203" pitchFamily="34" charset="0"/>
+            </a:endParaRPr>
+          </a:p>
+        </p:txBody>
+      </p:sp>
+    </p:spTree>
+    <p:extLst>
+      <p:ext uri="{BB962C8B-B14F-4D97-AF65-F5344CB8AC3E}">
+        <p14:creationId xmlns:p14="http://schemas.microsoft.com/office/powerpoint/2010/main" val="3994601803"/>
+      </p:ext>
+    </p:extLst>
+  </p:cSld>
+  <p:clrMapOvr>
+    <a:masterClrMapping/>
+  </p:clrMapOvr>
+</p:sld>
+</file>
+
+<file path=ppt/slides/slide14.xml><?xml version="1.0" encoding="utf-8"?>
+<p:sld xmlns:a="http://schemas.openxmlformats.org/drawingml/2006/main" xmlns:r="http://schemas.openxmlformats.org/officeDocument/2006/relationships" xmlns:p="http://schemas.openxmlformats.org/presentationml/2006/main">
+  <p:cSld>
+    <p:spTree>
+      <p:nvGrpSpPr>
+        <p:cNvPr id="1" name=""/>
+        <p:cNvGrpSpPr/>
+        <p:nvPr/>
+      </p:nvGrpSpPr>
+      <p:grpSpPr>
+        <a:xfrm>
+          <a:off x="0" y="0"/>
+          <a:ext cx="0" cy="0"/>
+          <a:chOff x="0" y="0"/>
+          <a:chExt cx="0" cy="0"/>
+        </a:xfrm>
+      </p:grpSpPr>
+      <p:sp>
+        <p:nvSpPr>
+          <p:cNvPr id="2" name="Title 1">
+            <a:extLst>
+              <a:ext uri="{FF2B5EF4-FFF2-40B4-BE49-F238E27FC236}">
+                <a16:creationId xmlns:a16="http://schemas.microsoft.com/office/drawing/2014/main" id="{5D7568B3-EC9A-45DD-8A17-CFE685194B65}"/>
+              </a:ext>
+            </a:extLst>
+          </p:cNvPr>
+          <p:cNvSpPr>
+            <a:spLocks noGrp="1"/>
+          </p:cNvSpPr>
+          <p:nvPr>
+            <p:ph type="title"/>
+          </p:nvPr>
+        </p:nvSpPr>
+        <p:spPr>
+          <a:xfrm>
+            <a:off x="838200" y="0"/>
+            <a:ext cx="10515600" cy="1325563"/>
+          </a:xfrm>
+          <a:solidFill>
+            <a:srgbClr val="2196F3"/>
+          </a:solidFill>
+        </p:spPr>
+        <p:txBody>
+          <a:bodyPr>
+            <a:normAutofit/>
+          </a:bodyPr>
+          <a:lstStyle/>
+          <a:p>
+            <a:pPr algn="ctr"/>
+            <a:r>
+              <a:rPr lang="en-GB" sz="6600" dirty="0">
+                <a:solidFill>
+                  <a:schemeClr val="bg1"/>
+                </a:solidFill>
+                <a:latin typeface="Segoe UI" panose="020B0502040204020203" pitchFamily="34" charset="0"/>
+                <a:cs typeface="Segoe UI" panose="020B0502040204020203" pitchFamily="34" charset="0"/>
+              </a:rPr>
+              <a:t>WP REST API &amp; AJAX</a:t>
+            </a:r>
+          </a:p>
+        </p:txBody>
+      </p:sp>
+      <p:sp>
+        <p:nvSpPr>
+          <p:cNvPr id="4" name="Content Placeholder 2">
+            <a:extLst>
+              <a:ext uri="{FF2B5EF4-FFF2-40B4-BE49-F238E27FC236}">
+                <a16:creationId xmlns:a16="http://schemas.microsoft.com/office/drawing/2014/main" id="{088CCB65-11B4-408B-9ED3-1304FE85032F}"/>
+              </a:ext>
+            </a:extLst>
+          </p:cNvPr>
+          <p:cNvSpPr>
+            <a:spLocks noGrp="1"/>
+          </p:cNvSpPr>
+          <p:nvPr>
+            <p:ph idx="1"/>
+          </p:nvPr>
+        </p:nvSpPr>
+        <p:spPr>
+          <a:xfrm>
+            <a:off x="838200" y="1431636"/>
+            <a:ext cx="10515600" cy="4742661"/>
+          </a:xfrm>
+        </p:spPr>
+        <p:txBody>
+          <a:bodyPr wrap="square" bIns="252000">
+            <a:normAutofit/>
+          </a:bodyPr>
+          <a:lstStyle/>
+          <a:p>
+            <a:pPr marL="457200" lvl="1" indent="0">
+              <a:buNone/>
+            </a:pPr>
+            <a:r>
+              <a:rPr lang="en-GB" sz="5100" dirty="0">
+                <a:solidFill>
+                  <a:srgbClr val="2196F3"/>
+                </a:solidFill>
+                <a:latin typeface="Segoe UI" panose="020B0502040204020203" pitchFamily="34" charset="0"/>
+                <a:cs typeface="Segoe UI" panose="020B0502040204020203" pitchFamily="34" charset="0"/>
+              </a:rPr>
+              <a:t>DECOUPLED WP</a:t>
+            </a:r>
+          </a:p>
+          <a:p>
+            <a:pPr marL="457200" lvl="1" indent="0">
+              <a:buNone/>
+            </a:pPr>
+            <a:endParaRPr lang="en-GB" sz="1050" dirty="0">
+              <a:solidFill>
+                <a:srgbClr val="2196F3"/>
+              </a:solidFill>
+              <a:latin typeface="Segoe UI" panose="020B0502040204020203" pitchFamily="34" charset="0"/>
+              <a:cs typeface="Segoe UI" panose="020B0502040204020203" pitchFamily="34" charset="0"/>
+            </a:endParaRPr>
+          </a:p>
+          <a:p>
+            <a:pPr lvl="1"/>
+            <a:r>
+              <a:rPr lang="en-GB" sz="2800" dirty="0">
+                <a:solidFill>
+                  <a:srgbClr val="2196F3"/>
+                </a:solidFill>
+                <a:latin typeface="Segoe UI" panose="020B0502040204020203" pitchFamily="34" charset="0"/>
+                <a:cs typeface="Segoe UI" panose="020B0502040204020203" pitchFamily="34" charset="0"/>
+              </a:rPr>
+              <a:t>As we are using JS blocks in our PHP pages this can lead to using these scripts in HTML pages or PHP outside of the WP ecosystem.</a:t>
+            </a:r>
+          </a:p>
+          <a:p>
+            <a:pPr lvl="1"/>
+            <a:r>
+              <a:rPr lang="en-GB" sz="2800" dirty="0">
+                <a:solidFill>
+                  <a:srgbClr val="2196F3"/>
+                </a:solidFill>
+                <a:latin typeface="Segoe UI" panose="020B0502040204020203" pitchFamily="34" charset="0"/>
+                <a:cs typeface="Segoe UI" panose="020B0502040204020203" pitchFamily="34" charset="0"/>
+              </a:rPr>
+              <a:t>This means we can have DECOUPLED or HEADLESS WP sites</a:t>
+            </a:r>
+          </a:p>
+          <a:p>
+            <a:pPr lvl="1"/>
+            <a:r>
+              <a:rPr lang="en-GB" sz="2800" dirty="0">
+                <a:solidFill>
+                  <a:srgbClr val="2196F3"/>
+                </a:solidFill>
+                <a:latin typeface="Segoe UI" panose="020B0502040204020203" pitchFamily="34" charset="0"/>
+                <a:cs typeface="Segoe UI" panose="020B0502040204020203" pitchFamily="34" charset="0"/>
+              </a:rPr>
+              <a:t>HEADLESS means formatting preconfigured.</a:t>
+            </a:r>
+          </a:p>
+          <a:p>
+            <a:pPr lvl="1"/>
+            <a:r>
+              <a:rPr lang="en-GB" sz="2800" dirty="0">
+                <a:solidFill>
+                  <a:srgbClr val="2196F3"/>
+                </a:solidFill>
+                <a:latin typeface="Segoe UI" panose="020B0502040204020203" pitchFamily="34" charset="0"/>
+                <a:cs typeface="Segoe UI" panose="020B0502040204020203" pitchFamily="34" charset="0"/>
+              </a:rPr>
+              <a:t>DECOUPLED means data is sent and page formats data.</a:t>
+            </a:r>
+          </a:p>
+          <a:p>
+            <a:pPr lvl="1"/>
+            <a:r>
+              <a:rPr lang="en-GB" sz="2800" dirty="0">
+                <a:solidFill>
+                  <a:srgbClr val="2196F3"/>
+                </a:solidFill>
+                <a:latin typeface="Segoe UI" panose="020B0502040204020203" pitchFamily="34" charset="0"/>
+                <a:cs typeface="Segoe UI" panose="020B0502040204020203" pitchFamily="34" charset="0"/>
+              </a:rPr>
+              <a:t>Using JSON WEB TOKENS (JWT) we can also authenticate…</a:t>
+            </a:r>
+          </a:p>
+          <a:p>
+            <a:pPr lvl="1"/>
+            <a:r>
+              <a:rPr lang="en-GB" sz="2800" dirty="0">
+                <a:solidFill>
+                  <a:srgbClr val="2196F3"/>
+                </a:solidFill>
+                <a:latin typeface="Segoe UI" panose="020B0502040204020203" pitchFamily="34" charset="0"/>
+                <a:cs typeface="Segoe UI" panose="020B0502040204020203" pitchFamily="34" charset="0"/>
+              </a:rPr>
+              <a:t>Example: https://wp-html.co.uk/semantic</a:t>
+            </a:r>
+          </a:p>
+          <a:p>
+            <a:pPr marL="457200" lvl="1" indent="0">
+              <a:buNone/>
+            </a:pPr>
+            <a:endParaRPr lang="en-GB" sz="6700" dirty="0">
+              <a:solidFill>
+                <a:srgbClr val="2196F3"/>
+              </a:solidFill>
+              <a:latin typeface="Segoe UI" panose="020B0502040204020203" pitchFamily="34" charset="0"/>
+              <a:cs typeface="Segoe UI" panose="020B0502040204020203" pitchFamily="34" charset="0"/>
+            </a:endParaRPr>
+          </a:p>
+          <a:p>
+            <a:pPr marL="457200" lvl="1" indent="0">
+              <a:buNone/>
+            </a:pPr>
+            <a:endParaRPr lang="en-GB" sz="6700" dirty="0">
+              <a:solidFill>
+                <a:srgbClr val="2196F3"/>
+              </a:solidFill>
+              <a:latin typeface="Segoe UI" panose="020B0502040204020203" pitchFamily="34" charset="0"/>
+              <a:cs typeface="Segoe UI" panose="020B0502040204020203" pitchFamily="34" charset="0"/>
+            </a:endParaRPr>
+          </a:p>
+          <a:p>
+            <a:pPr marL="457200" lvl="1" indent="0">
+              <a:buNone/>
+            </a:pPr>
+            <a:endParaRPr lang="en-GB" sz="6700" dirty="0">
+              <a:latin typeface="Segoe UI" panose="020B0502040204020203" pitchFamily="34" charset="0"/>
+              <a:cs typeface="Segoe UI" panose="020B0502040204020203" pitchFamily="34" charset="0"/>
+            </a:endParaRPr>
+          </a:p>
+          <a:p>
+            <a:pPr marL="0" indent="0">
+              <a:buNone/>
+            </a:pPr>
+            <a:endParaRPr lang="en-GB" dirty="0">
+              <a:latin typeface="Segoe UI" panose="020B0502040204020203" pitchFamily="34" charset="0"/>
+              <a:cs typeface="Segoe UI" panose="020B0502040204020203" pitchFamily="34" charset="0"/>
+            </a:endParaRPr>
+          </a:p>
+          <a:p>
+            <a:endParaRPr lang="en-GB" dirty="0">
+              <a:latin typeface="Segoe UI" panose="020B0502040204020203" pitchFamily="34" charset="0"/>
+              <a:cs typeface="Segoe UI" panose="020B0502040204020203" pitchFamily="34" charset="0"/>
+            </a:endParaRPr>
+          </a:p>
+        </p:txBody>
+      </p:sp>
+    </p:spTree>
+    <p:extLst>
+      <p:ext uri="{BB962C8B-B14F-4D97-AF65-F5344CB8AC3E}">
+        <p14:creationId xmlns:p14="http://schemas.microsoft.com/office/powerpoint/2010/main" val="863311338"/>
+      </p:ext>
+    </p:extLst>
+  </p:cSld>
+  <p:clrMapOvr>
+    <a:masterClrMapping/>
+  </p:clrMapOvr>
+</p:sld>
+</file>
+
+<file path=ppt/slides/slide15.xml><?xml version="1.0" encoding="utf-8"?>
+<p:sld xmlns:a="http://schemas.openxmlformats.org/drawingml/2006/main" xmlns:r="http://schemas.openxmlformats.org/officeDocument/2006/relationships" xmlns:p="http://schemas.openxmlformats.org/presentationml/2006/main">
+  <p:cSld>
+    <p:spTree>
+      <p:nvGrpSpPr>
+        <p:cNvPr id="1" name=""/>
+        <p:cNvGrpSpPr/>
+        <p:nvPr/>
+      </p:nvGrpSpPr>
+      <p:grpSpPr>
+        <a:xfrm>
+          <a:off x="0" y="0"/>
+          <a:ext cx="0" cy="0"/>
+          <a:chOff x="0" y="0"/>
+          <a:chExt cx="0" cy="0"/>
+        </a:xfrm>
+      </p:grpSpPr>
+      <p:sp>
+        <p:nvSpPr>
+          <p:cNvPr id="2" name="Title 1">
+            <a:extLst>
+              <a:ext uri="{FF2B5EF4-FFF2-40B4-BE49-F238E27FC236}">
+                <a16:creationId xmlns:a16="http://schemas.microsoft.com/office/drawing/2014/main" id="{5D7568B3-EC9A-45DD-8A17-CFE685194B65}"/>
+              </a:ext>
+            </a:extLst>
+          </p:cNvPr>
+          <p:cNvSpPr>
+            <a:spLocks noGrp="1"/>
+          </p:cNvSpPr>
+          <p:nvPr>
+            <p:ph type="title"/>
+          </p:nvPr>
+        </p:nvSpPr>
+        <p:spPr>
+          <a:xfrm>
+            <a:off x="838200" y="0"/>
+            <a:ext cx="10515600" cy="1325563"/>
+          </a:xfrm>
+          <a:solidFill>
+            <a:srgbClr val="2196F3"/>
+          </a:solidFill>
+        </p:spPr>
+        <p:txBody>
+          <a:bodyPr>
+            <a:normAutofit/>
+          </a:bodyPr>
+          <a:lstStyle/>
+          <a:p>
+            <a:pPr algn="ctr"/>
+            <a:r>
+              <a:rPr lang="en-GB" sz="6600" dirty="0">
+                <a:solidFill>
+                  <a:schemeClr val="bg1"/>
+                </a:solidFill>
+                <a:latin typeface="Segoe UI" panose="020B0502040204020203" pitchFamily="34" charset="0"/>
+                <a:cs typeface="Segoe UI" panose="020B0502040204020203" pitchFamily="34" charset="0"/>
+              </a:rPr>
+              <a:t>WP REST API &amp; AJAX</a:t>
+            </a:r>
+          </a:p>
+        </p:txBody>
+      </p:sp>
+      <p:sp>
+        <p:nvSpPr>
+          <p:cNvPr id="4" name="Content Placeholder 2">
+            <a:extLst>
+              <a:ext uri="{FF2B5EF4-FFF2-40B4-BE49-F238E27FC236}">
+                <a16:creationId xmlns:a16="http://schemas.microsoft.com/office/drawing/2014/main" id="{088CCB65-11B4-408B-9ED3-1304FE85032F}"/>
+              </a:ext>
+            </a:extLst>
+          </p:cNvPr>
+          <p:cNvSpPr>
+            <a:spLocks noGrp="1"/>
+          </p:cNvSpPr>
+          <p:nvPr>
+            <p:ph idx="1"/>
+          </p:nvPr>
+        </p:nvSpPr>
+        <p:spPr>
+          <a:xfrm>
+            <a:off x="838200" y="1431636"/>
+            <a:ext cx="10515600" cy="4742661"/>
+          </a:xfrm>
+        </p:spPr>
+        <p:txBody>
+          <a:bodyPr wrap="square" bIns="252000">
+            <a:normAutofit lnSpcReduction="10000"/>
+          </a:bodyPr>
+          <a:lstStyle/>
+          <a:p>
+            <a:pPr marL="457200" lvl="1" indent="0">
+              <a:buNone/>
+            </a:pPr>
+            <a:r>
+              <a:rPr lang="en-GB" sz="5100" dirty="0">
+                <a:solidFill>
+                  <a:srgbClr val="2196F3"/>
+                </a:solidFill>
+                <a:latin typeface="Segoe UI" panose="020B0502040204020203" pitchFamily="34" charset="0"/>
+                <a:cs typeface="Segoe UI" panose="020B0502040204020203" pitchFamily="34" charset="0"/>
+              </a:rPr>
+              <a:t>WP REST API + Web Components</a:t>
+            </a:r>
+          </a:p>
+          <a:p>
+            <a:pPr marL="457200" lvl="1" indent="0">
+              <a:buNone/>
+            </a:pPr>
+            <a:r>
+              <a:rPr lang="en-GB" sz="5100" dirty="0">
+                <a:solidFill>
+                  <a:srgbClr val="2196F3"/>
+                </a:solidFill>
+                <a:latin typeface="Segoe UI" panose="020B0502040204020203" pitchFamily="34" charset="0"/>
+                <a:cs typeface="Segoe UI" panose="020B0502040204020203" pitchFamily="34" charset="0"/>
+              </a:rPr>
+              <a:t>=&gt; 100% INTERNET</a:t>
+            </a:r>
+          </a:p>
+          <a:p>
+            <a:pPr marL="457200" lvl="1" indent="0">
+              <a:buNone/>
+            </a:pPr>
+            <a:endParaRPr lang="en-GB" sz="1050" dirty="0">
+              <a:solidFill>
+                <a:srgbClr val="2196F3"/>
+              </a:solidFill>
+              <a:latin typeface="Segoe UI" panose="020B0502040204020203" pitchFamily="34" charset="0"/>
+              <a:cs typeface="Segoe UI" panose="020B0502040204020203" pitchFamily="34" charset="0"/>
+            </a:endParaRPr>
+          </a:p>
+          <a:p>
+            <a:pPr lvl="1"/>
+            <a:r>
+              <a:rPr lang="en-GB" sz="2800" dirty="0">
+                <a:solidFill>
+                  <a:srgbClr val="2196F3"/>
+                </a:solidFill>
+                <a:latin typeface="Segoe UI" panose="020B0502040204020203" pitchFamily="34" charset="0"/>
+                <a:cs typeface="Segoe UI" panose="020B0502040204020203" pitchFamily="34" charset="0"/>
+              </a:rPr>
+              <a:t>Web Components are custom HTML elements/tags that we can create.</a:t>
+            </a:r>
+          </a:p>
+          <a:p>
+            <a:pPr lvl="1"/>
+            <a:r>
+              <a:rPr lang="en-GB" sz="2800" dirty="0">
+                <a:solidFill>
+                  <a:srgbClr val="2196F3"/>
+                </a:solidFill>
+                <a:latin typeface="Segoe UI" panose="020B0502040204020203" pitchFamily="34" charset="0"/>
+                <a:cs typeface="Segoe UI" panose="020B0502040204020203" pitchFamily="34" charset="0"/>
+              </a:rPr>
+              <a:t>We define a tag and associate with a JS Class.</a:t>
+            </a:r>
+          </a:p>
+          <a:p>
+            <a:pPr lvl="1"/>
+            <a:r>
+              <a:rPr lang="en-GB" sz="2800" dirty="0">
+                <a:solidFill>
+                  <a:srgbClr val="2196F3"/>
+                </a:solidFill>
+                <a:latin typeface="Segoe UI" panose="020B0502040204020203" pitchFamily="34" charset="0"/>
+                <a:cs typeface="Segoe UI" panose="020B0502040204020203" pitchFamily="34" charset="0"/>
+              </a:rPr>
+              <a:t>They are regular HTML so can be used wherever HTML is used and also be wired into JS Framework builds.</a:t>
+            </a:r>
+          </a:p>
+          <a:p>
+            <a:pPr lvl="1"/>
+            <a:r>
+              <a:rPr lang="en-GB" sz="2800" dirty="0">
+                <a:solidFill>
+                  <a:srgbClr val="2196F3"/>
+                </a:solidFill>
+                <a:latin typeface="Segoe UI" panose="020B0502040204020203" pitchFamily="34" charset="0"/>
+                <a:cs typeface="Segoe UI" panose="020B0502040204020203" pitchFamily="34" charset="0"/>
+              </a:rPr>
+              <a:t>The example of DECOUPLED WP is in fact built entirely with Web Components…let’s look at the source code…</a:t>
+            </a:r>
+          </a:p>
+          <a:p>
+            <a:pPr marL="457200" lvl="1" indent="0">
+              <a:buNone/>
+            </a:pPr>
+            <a:endParaRPr lang="en-GB" sz="6700" dirty="0">
+              <a:solidFill>
+                <a:srgbClr val="2196F3"/>
+              </a:solidFill>
+              <a:latin typeface="Segoe UI" panose="020B0502040204020203" pitchFamily="34" charset="0"/>
+              <a:cs typeface="Segoe UI" panose="020B0502040204020203" pitchFamily="34" charset="0"/>
+            </a:endParaRPr>
+          </a:p>
+          <a:p>
+            <a:pPr marL="457200" lvl="1" indent="0">
+              <a:buNone/>
+            </a:pPr>
+            <a:endParaRPr lang="en-GB" sz="6700" dirty="0">
+              <a:solidFill>
+                <a:srgbClr val="2196F3"/>
+              </a:solidFill>
+              <a:latin typeface="Segoe UI" panose="020B0502040204020203" pitchFamily="34" charset="0"/>
+              <a:cs typeface="Segoe UI" panose="020B0502040204020203" pitchFamily="34" charset="0"/>
+            </a:endParaRPr>
+          </a:p>
+          <a:p>
+            <a:pPr marL="457200" lvl="1" indent="0">
+              <a:buNone/>
+            </a:pPr>
+            <a:endParaRPr lang="en-GB" sz="6700" dirty="0">
+              <a:latin typeface="Segoe UI" panose="020B0502040204020203" pitchFamily="34" charset="0"/>
+              <a:cs typeface="Segoe UI" panose="020B0502040204020203" pitchFamily="34" charset="0"/>
+            </a:endParaRPr>
+          </a:p>
+          <a:p>
+            <a:pPr marL="0" indent="0">
+              <a:buNone/>
+            </a:pPr>
+            <a:endParaRPr lang="en-GB" dirty="0">
+              <a:latin typeface="Segoe UI" panose="020B0502040204020203" pitchFamily="34" charset="0"/>
+              <a:cs typeface="Segoe UI" panose="020B0502040204020203" pitchFamily="34" charset="0"/>
+            </a:endParaRPr>
+          </a:p>
+          <a:p>
+            <a:endParaRPr lang="en-GB" dirty="0">
+              <a:latin typeface="Segoe UI" panose="020B0502040204020203" pitchFamily="34" charset="0"/>
+              <a:cs typeface="Segoe UI" panose="020B0502040204020203" pitchFamily="34" charset="0"/>
+            </a:endParaRPr>
+          </a:p>
+        </p:txBody>
+      </p:sp>
+    </p:spTree>
+    <p:extLst>
+      <p:ext uri="{BB962C8B-B14F-4D97-AF65-F5344CB8AC3E}">
+        <p14:creationId xmlns:p14="http://schemas.microsoft.com/office/powerpoint/2010/main" val="16959895"/>
+      </p:ext>
+    </p:extLst>
+  </p:cSld>
+  <p:clrMapOvr>
+    <a:masterClrMapping/>
+  </p:clrMapOvr>
+</p:sld>
+</file>
+
+<file path=ppt/slides/slide16.xml><?xml version="1.0" encoding="utf-8"?>
+<p:sld xmlns:a="http://schemas.openxmlformats.org/drawingml/2006/main" xmlns:r="http://schemas.openxmlformats.org/officeDocument/2006/relationships" xmlns:p="http://schemas.openxmlformats.org/presentationml/2006/main">
+  <p:cSld>
+    <p:spTree>
+      <p:nvGrpSpPr>
+        <p:cNvPr id="1" name=""/>
+        <p:cNvGrpSpPr/>
+        <p:nvPr/>
+      </p:nvGrpSpPr>
+      <p:grpSpPr>
+        <a:xfrm>
+          <a:off x="0" y="0"/>
+          <a:ext cx="0" cy="0"/>
+          <a:chOff x="0" y="0"/>
+          <a:chExt cx="0" cy="0"/>
+        </a:xfrm>
+      </p:grpSpPr>
+      <p:sp>
+        <p:nvSpPr>
+          <p:cNvPr id="2" name="Title 1">
+            <a:extLst>
+              <a:ext uri="{FF2B5EF4-FFF2-40B4-BE49-F238E27FC236}">
+                <a16:creationId xmlns:a16="http://schemas.microsoft.com/office/drawing/2014/main" id="{5D7568B3-EC9A-45DD-8A17-CFE685194B65}"/>
+              </a:ext>
+            </a:extLst>
+          </p:cNvPr>
+          <p:cNvSpPr>
+            <a:spLocks noGrp="1"/>
+          </p:cNvSpPr>
+          <p:nvPr>
+            <p:ph type="title"/>
+          </p:nvPr>
+        </p:nvSpPr>
+        <p:spPr>
+          <a:xfrm>
+            <a:off x="838200" y="0"/>
+            <a:ext cx="10515600" cy="1325563"/>
+          </a:xfrm>
+          <a:solidFill>
+            <a:srgbClr val="2196F3"/>
+          </a:solidFill>
+        </p:spPr>
+        <p:txBody>
+          <a:bodyPr>
+            <a:normAutofit/>
+          </a:bodyPr>
+          <a:lstStyle/>
+          <a:p>
+            <a:pPr algn="ctr"/>
+            <a:r>
+              <a:rPr lang="en-GB" sz="6600" dirty="0">
+                <a:solidFill>
+                  <a:schemeClr val="bg1"/>
+                </a:solidFill>
+                <a:latin typeface="Segoe UI" panose="020B0502040204020203" pitchFamily="34" charset="0"/>
+                <a:cs typeface="Segoe UI" panose="020B0502040204020203" pitchFamily="34" charset="0"/>
+              </a:rPr>
+              <a:t>WP REST API &amp; AJAX</a:t>
+            </a:r>
+          </a:p>
+        </p:txBody>
+      </p:sp>
+      <p:sp>
+        <p:nvSpPr>
+          <p:cNvPr id="4" name="Content Placeholder 2">
+            <a:extLst>
+              <a:ext uri="{FF2B5EF4-FFF2-40B4-BE49-F238E27FC236}">
+                <a16:creationId xmlns:a16="http://schemas.microsoft.com/office/drawing/2014/main" id="{088CCB65-11B4-408B-9ED3-1304FE85032F}"/>
+              </a:ext>
+            </a:extLst>
+          </p:cNvPr>
+          <p:cNvSpPr>
+            <a:spLocks noGrp="1"/>
+          </p:cNvSpPr>
+          <p:nvPr>
+            <p:ph idx="1"/>
+          </p:nvPr>
+        </p:nvSpPr>
+        <p:spPr>
+          <a:xfrm>
+            <a:off x="838200" y="1431636"/>
+            <a:ext cx="10515600" cy="4742661"/>
+          </a:xfrm>
+        </p:spPr>
+        <p:txBody>
+          <a:bodyPr wrap="square" bIns="252000">
+            <a:normAutofit/>
+          </a:bodyPr>
+          <a:lstStyle/>
+          <a:p>
+            <a:pPr marL="457200" lvl="1" indent="0">
+              <a:buNone/>
+            </a:pPr>
+            <a:r>
+              <a:rPr lang="en-GB" sz="5100" dirty="0">
+                <a:solidFill>
+                  <a:srgbClr val="2196F3"/>
+                </a:solidFill>
+                <a:latin typeface="Segoe UI" panose="020B0502040204020203" pitchFamily="34" charset="0"/>
+                <a:cs typeface="Segoe UI" panose="020B0502040204020203" pitchFamily="34" charset="0"/>
+              </a:rPr>
+              <a:t>What are the </a:t>
+            </a:r>
+            <a:r>
+              <a:rPr lang="en-GB" sz="5100" dirty="0" err="1">
+                <a:solidFill>
+                  <a:srgbClr val="2196F3"/>
+                </a:solidFill>
+                <a:latin typeface="Segoe UI" panose="020B0502040204020203" pitchFamily="34" charset="0"/>
+                <a:cs typeface="Segoe UI" panose="020B0502040204020203" pitchFamily="34" charset="0"/>
+              </a:rPr>
+              <a:t>impications</a:t>
+            </a:r>
+            <a:r>
+              <a:rPr lang="en-GB" sz="5100" dirty="0">
+                <a:solidFill>
+                  <a:srgbClr val="2196F3"/>
+                </a:solidFill>
+                <a:latin typeface="Segoe UI" panose="020B0502040204020203" pitchFamily="34" charset="0"/>
+                <a:cs typeface="Segoe UI" panose="020B0502040204020203" pitchFamily="34" charset="0"/>
+              </a:rPr>
+              <a:t>?</a:t>
+            </a:r>
+          </a:p>
+          <a:p>
+            <a:pPr marL="457200" lvl="1" indent="0">
+              <a:buNone/>
+            </a:pPr>
+            <a:endParaRPr lang="en-GB" sz="1050" dirty="0">
+              <a:solidFill>
+                <a:srgbClr val="2196F3"/>
+              </a:solidFill>
+              <a:latin typeface="Segoe UI" panose="020B0502040204020203" pitchFamily="34" charset="0"/>
+              <a:cs typeface="Segoe UI" panose="020B0502040204020203" pitchFamily="34" charset="0"/>
+            </a:endParaRPr>
+          </a:p>
+          <a:p>
+            <a:pPr lvl="1"/>
+            <a:r>
+              <a:rPr lang="en-GB" sz="2800" dirty="0">
+                <a:solidFill>
+                  <a:srgbClr val="2196F3"/>
+                </a:solidFill>
+                <a:latin typeface="Segoe UI" panose="020B0502040204020203" pitchFamily="34" charset="0"/>
+                <a:cs typeface="Segoe UI" panose="020B0502040204020203" pitchFamily="34" charset="0"/>
+              </a:rPr>
+              <a:t>These Web Components can be thought of as HTML Plugins.</a:t>
+            </a:r>
+          </a:p>
+          <a:p>
+            <a:pPr lvl="1"/>
+            <a:r>
+              <a:rPr lang="en-GB" sz="2800" dirty="0">
+                <a:solidFill>
+                  <a:srgbClr val="2196F3"/>
+                </a:solidFill>
+                <a:latin typeface="Segoe UI" panose="020B0502040204020203" pitchFamily="34" charset="0"/>
+                <a:cs typeface="Segoe UI" panose="020B0502040204020203" pitchFamily="34" charset="0"/>
+              </a:rPr>
+              <a:t>Other sites can use these highly functional HTML Plugins to render out WP site’s content and functionality.</a:t>
+            </a:r>
+          </a:p>
+          <a:p>
+            <a:pPr lvl="1"/>
+            <a:r>
+              <a:rPr lang="en-GB" sz="2800" dirty="0">
+                <a:solidFill>
+                  <a:srgbClr val="2196F3"/>
+                </a:solidFill>
+                <a:latin typeface="Segoe UI" panose="020B0502040204020203" pitchFamily="34" charset="0"/>
+                <a:cs typeface="Segoe UI" panose="020B0502040204020203" pitchFamily="34" charset="0"/>
+              </a:rPr>
+              <a:t>This has opportunities for increased agency work for our clients.</a:t>
+            </a:r>
+          </a:p>
+          <a:p>
+            <a:pPr lvl="1"/>
+            <a:r>
+              <a:rPr lang="en-GB" sz="2800" dirty="0">
+                <a:solidFill>
+                  <a:srgbClr val="2196F3"/>
+                </a:solidFill>
+                <a:latin typeface="Segoe UI" panose="020B0502040204020203" pitchFamily="34" charset="0"/>
+                <a:cs typeface="Segoe UI" panose="020B0502040204020203" pitchFamily="34" charset="0"/>
+              </a:rPr>
+              <a:t>It can also create extended exposure, SEO and business partnerships…our WP provides content/service for another site.</a:t>
+            </a:r>
+          </a:p>
+          <a:p>
+            <a:pPr marL="457200" lvl="1" indent="0">
+              <a:buNone/>
+            </a:pPr>
+            <a:endParaRPr lang="en-GB" sz="6700" dirty="0">
+              <a:solidFill>
+                <a:srgbClr val="2196F3"/>
+              </a:solidFill>
+              <a:latin typeface="Segoe UI" panose="020B0502040204020203" pitchFamily="34" charset="0"/>
+              <a:cs typeface="Segoe UI" panose="020B0502040204020203" pitchFamily="34" charset="0"/>
+            </a:endParaRPr>
+          </a:p>
+          <a:p>
+            <a:pPr marL="457200" lvl="1" indent="0">
+              <a:buNone/>
+            </a:pPr>
+            <a:endParaRPr lang="en-GB" sz="6700" dirty="0">
+              <a:solidFill>
+                <a:srgbClr val="2196F3"/>
+              </a:solidFill>
+              <a:latin typeface="Segoe UI" panose="020B0502040204020203" pitchFamily="34" charset="0"/>
+              <a:cs typeface="Segoe UI" panose="020B0502040204020203" pitchFamily="34" charset="0"/>
+            </a:endParaRPr>
+          </a:p>
+          <a:p>
+            <a:pPr marL="457200" lvl="1" indent="0">
+              <a:buNone/>
+            </a:pPr>
+            <a:endParaRPr lang="en-GB" sz="6700" dirty="0">
+              <a:latin typeface="Segoe UI" panose="020B0502040204020203" pitchFamily="34" charset="0"/>
+              <a:cs typeface="Segoe UI" panose="020B0502040204020203" pitchFamily="34" charset="0"/>
+            </a:endParaRPr>
+          </a:p>
+          <a:p>
+            <a:pPr marL="0" indent="0">
+              <a:buNone/>
+            </a:pPr>
+            <a:endParaRPr lang="en-GB" dirty="0">
+              <a:latin typeface="Segoe UI" panose="020B0502040204020203" pitchFamily="34" charset="0"/>
+              <a:cs typeface="Segoe UI" panose="020B0502040204020203" pitchFamily="34" charset="0"/>
+            </a:endParaRPr>
+          </a:p>
+          <a:p>
+            <a:endParaRPr lang="en-GB" dirty="0">
+              <a:latin typeface="Segoe UI" panose="020B0502040204020203" pitchFamily="34" charset="0"/>
+              <a:cs typeface="Segoe UI" panose="020B0502040204020203" pitchFamily="34" charset="0"/>
+            </a:endParaRPr>
+          </a:p>
+        </p:txBody>
+      </p:sp>
+    </p:spTree>
+    <p:extLst>
+      <p:ext uri="{BB962C8B-B14F-4D97-AF65-F5344CB8AC3E}">
+        <p14:creationId xmlns:p14="http://schemas.microsoft.com/office/powerpoint/2010/main" val="3413793321"/>
+      </p:ext>
+    </p:extLst>
+  </p:cSld>
+  <p:clrMapOvr>
+    <a:masterClrMapping/>
+  </p:clrMapOvr>
+</p:sld>
+</file>
+
+<file path=ppt/slides/slide17.xml><?xml version="1.0" encoding="utf-8"?>
+<p:sld xmlns:a="http://schemas.openxmlformats.org/drawingml/2006/main" xmlns:r="http://schemas.openxmlformats.org/officeDocument/2006/relationships" xmlns:p="http://schemas.openxmlformats.org/presentationml/2006/main">
+  <p:cSld>
+    <p:spTree>
+      <p:nvGrpSpPr>
+        <p:cNvPr id="1" name=""/>
+        <p:cNvGrpSpPr/>
+        <p:nvPr/>
+      </p:nvGrpSpPr>
+      <p:grpSpPr>
+        <a:xfrm>
+          <a:off x="0" y="0"/>
+          <a:ext cx="0" cy="0"/>
+          <a:chOff x="0" y="0"/>
+          <a:chExt cx="0" cy="0"/>
+        </a:xfrm>
+      </p:grpSpPr>
+      <p:sp>
+        <p:nvSpPr>
+          <p:cNvPr id="2" name="Title 1">
+            <a:extLst>
+              <a:ext uri="{FF2B5EF4-FFF2-40B4-BE49-F238E27FC236}">
+                <a16:creationId xmlns:a16="http://schemas.microsoft.com/office/drawing/2014/main" id="{5D7568B3-EC9A-45DD-8A17-CFE685194B65}"/>
+              </a:ext>
+            </a:extLst>
+          </p:cNvPr>
+          <p:cNvSpPr>
+            <a:spLocks noGrp="1"/>
+          </p:cNvSpPr>
+          <p:nvPr>
+            <p:ph type="title"/>
+          </p:nvPr>
+        </p:nvSpPr>
+        <p:spPr>
+          <a:xfrm>
+            <a:off x="838200" y="0"/>
+            <a:ext cx="10515600" cy="1325563"/>
+          </a:xfrm>
+          <a:solidFill>
+            <a:srgbClr val="2196F3"/>
+          </a:solidFill>
+        </p:spPr>
+        <p:txBody>
+          <a:bodyPr>
+            <a:normAutofit/>
+          </a:bodyPr>
+          <a:lstStyle/>
+          <a:p>
+            <a:pPr algn="ctr"/>
+            <a:r>
+              <a:rPr lang="en-GB" sz="6600" dirty="0">
+                <a:solidFill>
+                  <a:schemeClr val="bg1"/>
+                </a:solidFill>
+                <a:latin typeface="Segoe UI" panose="020B0502040204020203" pitchFamily="34" charset="0"/>
+                <a:cs typeface="Segoe UI" panose="020B0502040204020203" pitchFamily="34" charset="0"/>
+              </a:rPr>
+              <a:t>WP REST API &amp; AJAX</a:t>
+            </a:r>
+          </a:p>
+        </p:txBody>
+      </p:sp>
+      <p:sp>
+        <p:nvSpPr>
+          <p:cNvPr id="4" name="Content Placeholder 2">
+            <a:extLst>
+              <a:ext uri="{FF2B5EF4-FFF2-40B4-BE49-F238E27FC236}">
+                <a16:creationId xmlns:a16="http://schemas.microsoft.com/office/drawing/2014/main" id="{088CCB65-11B4-408B-9ED3-1304FE85032F}"/>
+              </a:ext>
+            </a:extLst>
+          </p:cNvPr>
+          <p:cNvSpPr>
+            <a:spLocks noGrp="1"/>
+          </p:cNvSpPr>
+          <p:nvPr>
+            <p:ph idx="1"/>
+          </p:nvPr>
+        </p:nvSpPr>
+        <p:spPr>
+          <a:xfrm>
+            <a:off x="838200" y="1431636"/>
+            <a:ext cx="10515600" cy="4742661"/>
+          </a:xfrm>
+        </p:spPr>
+        <p:txBody>
+          <a:bodyPr wrap="square" bIns="252000">
+            <a:normAutofit/>
+          </a:bodyPr>
+          <a:lstStyle/>
+          <a:p>
+            <a:pPr marL="457200" lvl="1" indent="0" algn="ctr">
+              <a:buNone/>
+            </a:pPr>
+            <a:r>
+              <a:rPr lang="en-GB" sz="5100" dirty="0">
+                <a:solidFill>
+                  <a:srgbClr val="2196F3"/>
+                </a:solidFill>
+                <a:latin typeface="Segoe UI" panose="020B0502040204020203" pitchFamily="34" charset="0"/>
+                <a:cs typeface="Segoe UI" panose="020B0502040204020203" pitchFamily="34" charset="0"/>
+              </a:rPr>
+              <a:t>Craig West</a:t>
+            </a:r>
+          </a:p>
+          <a:p>
+            <a:pPr marL="457200" lvl="1" indent="0" algn="ctr">
+              <a:buNone/>
+            </a:pPr>
+            <a:r>
+              <a:rPr lang="en-GB" sz="5100" dirty="0">
+                <a:solidFill>
+                  <a:srgbClr val="2196F3"/>
+                </a:solidFill>
+                <a:latin typeface="Segoe UI" panose="020B0502040204020203" pitchFamily="34" charset="0"/>
+                <a:cs typeface="Segoe UI" panose="020B0502040204020203" pitchFamily="34" charset="0"/>
+              </a:rPr>
+              <a:t>craig@wpjs.co.uk</a:t>
+            </a:r>
+          </a:p>
+          <a:p>
+            <a:pPr marL="457200" lvl="1" indent="0">
+              <a:buNone/>
+            </a:pPr>
+            <a:endParaRPr lang="en-GB" sz="3200" dirty="0">
+              <a:solidFill>
+                <a:srgbClr val="2196F3"/>
+              </a:solidFill>
+              <a:latin typeface="Segoe UI" panose="020B0502040204020203" pitchFamily="34" charset="0"/>
+              <a:cs typeface="Segoe UI" panose="020B0502040204020203" pitchFamily="34" charset="0"/>
+            </a:endParaRPr>
+          </a:p>
+          <a:p>
+            <a:pPr marL="457200" lvl="1" indent="0">
+              <a:buNone/>
+            </a:pPr>
+            <a:r>
+              <a:rPr lang="en-GB" sz="3200" dirty="0">
+                <a:solidFill>
+                  <a:srgbClr val="2196F3"/>
+                </a:solidFill>
+                <a:latin typeface="Segoe UI" panose="020B0502040204020203" pitchFamily="34" charset="0"/>
+                <a:cs typeface="Segoe UI" panose="020B0502040204020203" pitchFamily="34" charset="0"/>
+              </a:rPr>
+              <a:t>I offer regular no fee online workshops on Progressive Web Apps, Web Components, WP-HTML, JavaScript for WP developers and High Performance Websites.</a:t>
+            </a:r>
+          </a:p>
+          <a:p>
+            <a:pPr marL="457200" lvl="1" indent="0">
+              <a:buNone/>
+            </a:pPr>
+            <a:endParaRPr lang="en-GB" sz="3200" dirty="0">
+              <a:solidFill>
+                <a:srgbClr val="2196F3"/>
+              </a:solidFill>
+              <a:latin typeface="Segoe UI" panose="020B0502040204020203" pitchFamily="34" charset="0"/>
+              <a:cs typeface="Segoe UI" panose="020B0502040204020203" pitchFamily="34" charset="0"/>
+            </a:endParaRPr>
+          </a:p>
+          <a:p>
+            <a:pPr marL="457200" lvl="1" indent="0">
+              <a:buNone/>
+            </a:pPr>
+            <a:r>
+              <a:rPr lang="en-GB" sz="3200" dirty="0">
+                <a:solidFill>
+                  <a:srgbClr val="2196F3"/>
+                </a:solidFill>
+                <a:latin typeface="Segoe UI" panose="020B0502040204020203" pitchFamily="34" charset="0"/>
+                <a:cs typeface="Segoe UI" panose="020B0502040204020203" pitchFamily="34" charset="0"/>
+              </a:rPr>
+              <a:t>Please email me for more details.</a:t>
+            </a:r>
+            <a:endParaRPr lang="en-GB" sz="1400" dirty="0">
+              <a:solidFill>
+                <a:srgbClr val="2196F3"/>
+              </a:solidFill>
+              <a:latin typeface="Segoe UI" panose="020B0502040204020203" pitchFamily="34" charset="0"/>
+              <a:cs typeface="Segoe UI" panose="020B0502040204020203" pitchFamily="34" charset="0"/>
+            </a:endParaRPr>
+          </a:p>
+          <a:p>
+            <a:pPr marL="457200" lvl="1" indent="0">
+              <a:buNone/>
+            </a:pPr>
+            <a:endParaRPr lang="en-GB" sz="6700" dirty="0">
+              <a:solidFill>
+                <a:srgbClr val="2196F3"/>
+              </a:solidFill>
+              <a:latin typeface="Segoe UI" panose="020B0502040204020203" pitchFamily="34" charset="0"/>
+              <a:cs typeface="Segoe UI" panose="020B0502040204020203" pitchFamily="34" charset="0"/>
+            </a:endParaRPr>
+          </a:p>
+          <a:p>
+            <a:pPr marL="457200" lvl="1" indent="0">
+              <a:buNone/>
+            </a:pPr>
+            <a:endParaRPr lang="en-GB" sz="6700" dirty="0">
+              <a:solidFill>
+                <a:srgbClr val="2196F3"/>
+              </a:solidFill>
+              <a:latin typeface="Segoe UI" panose="020B0502040204020203" pitchFamily="34" charset="0"/>
+              <a:cs typeface="Segoe UI" panose="020B0502040204020203" pitchFamily="34" charset="0"/>
+            </a:endParaRPr>
+          </a:p>
+          <a:p>
+            <a:pPr marL="457200" lvl="1" indent="0">
+              <a:buNone/>
+            </a:pPr>
+            <a:endParaRPr lang="en-GB" sz="6700" dirty="0">
+              <a:latin typeface="Segoe UI" panose="020B0502040204020203" pitchFamily="34" charset="0"/>
+              <a:cs typeface="Segoe UI" panose="020B0502040204020203" pitchFamily="34" charset="0"/>
+            </a:endParaRPr>
+          </a:p>
+          <a:p>
+            <a:pPr marL="0" indent="0">
+              <a:buNone/>
+            </a:pPr>
+            <a:endParaRPr lang="en-GB" dirty="0">
+              <a:latin typeface="Segoe UI" panose="020B0502040204020203" pitchFamily="34" charset="0"/>
+              <a:cs typeface="Segoe UI" panose="020B0502040204020203" pitchFamily="34" charset="0"/>
+            </a:endParaRPr>
+          </a:p>
+          <a:p>
+            <a:endParaRPr lang="en-GB" dirty="0">
+              <a:latin typeface="Segoe UI" panose="020B0502040204020203" pitchFamily="34" charset="0"/>
+              <a:cs typeface="Segoe UI" panose="020B0502040204020203" pitchFamily="34" charset="0"/>
+            </a:endParaRPr>
+          </a:p>
+        </p:txBody>
+      </p:sp>
+    </p:spTree>
+    <p:extLst>
+      <p:ext uri="{BB962C8B-B14F-4D97-AF65-F5344CB8AC3E}">
+        <p14:creationId xmlns:p14="http://schemas.microsoft.com/office/powerpoint/2010/main" val="646359644"/>
       </p:ext>
     </p:extLst>
   </p:cSld>
@@ -6167,16 +7734,6 @@
           <a:p>
             <a:pPr lvl="1"/>
             <a:r>
-              <a:rPr lang="en-GB" sz="2800">
-                <a:solidFill>
-                  <a:srgbClr val="2196F3"/>
-                </a:solidFill>
-                <a:latin typeface="Segoe UI" panose="020B0502040204020203" pitchFamily="34" charset="0"/>
-                <a:cs typeface="Segoe UI" panose="020B0502040204020203" pitchFamily="34" charset="0"/>
-              </a:rPr>
-              <a:t>Use </a:t>
-            </a:r>
-            <a:r>
               <a:rPr lang="en-GB" sz="2800" dirty="0">
                 <a:solidFill>
                   <a:srgbClr val="2196F3"/>
@@ -6184,7 +7741,7 @@
                 <a:latin typeface="Segoe UI" panose="020B0502040204020203" pitchFamily="34" charset="0"/>
                 <a:cs typeface="Segoe UI" panose="020B0502040204020203" pitchFamily="34" charset="0"/>
               </a:rPr>
-              <a:t>them for GET/POST requests</a:t>
+              <a:t>Use them for GET/POST requests</a:t>
             </a:r>
           </a:p>
           <a:p>
@@ -6214,18 +7771,16 @@
             </a:r>
           </a:p>
           <a:p>
-            <a:pPr marL="1371600" lvl="3" indent="0">
-              <a:buNone/>
-            </a:pPr>
-            <a:r>
-              <a:rPr lang="en-GB" sz="1200" dirty="0">
-                <a:solidFill>
-                  <a:srgbClr val="2196F3"/>
-                </a:solidFill>
-                <a:latin typeface="Segoe UI" panose="020B0502040204020203" pitchFamily="34" charset="0"/>
-                <a:cs typeface="Segoe UI" panose="020B0502040204020203" pitchFamily="34" charset="0"/>
-              </a:rPr>
-              <a:t>DEMO=&gt;</a:t>
+            <a:pPr lvl="1"/>
+            <a:r>
+              <a:rPr lang="en-GB" sz="2800" dirty="0">
+                <a:solidFill>
+                  <a:srgbClr val="2196F3"/>
+                </a:solidFill>
+                <a:latin typeface="Segoe UI" panose="020B0502040204020203" pitchFamily="34" charset="0"/>
+                <a:cs typeface="Segoe UI" panose="020B0502040204020203" pitchFamily="34" charset="0"/>
+              </a:rPr>
+              <a:t>OPTIONAL: DECOUPLED AUTHENTICATION</a:t>
             </a:r>
           </a:p>
           <a:p>

</xml_diff>